<commit_message>
last modification just before presentation
</commit_message>
<xml_diff>
--- a/Docs/PFE-CEGEFOS - Groupe 2 VF.pptx
+++ b/Docs/PFE-CEGEFOS - Groupe 2 VF.pptx
@@ -4200,7 +4200,7 @@
   <dgm:whole/>
   <dgm:extLst>
     <a:ext uri="http://schemas.microsoft.com/office/drawing/2008/diagram">
-      <dsp:dataModelExt xmlns:dsp="http://schemas.microsoft.com/office/drawing/2008/diagram" relId="rId6" minVer="http://schemas.openxmlformats.org/drawingml/2006/diagram"/>
+      <dsp:dataModelExt xmlns:dsp="http://schemas.microsoft.com/office/drawing/2008/diagram" relId="rId7" minVer="http://schemas.openxmlformats.org/drawingml/2006/diagram"/>
     </a:ext>
   </dgm:extLst>
 </dgm:dataModel>
@@ -4460,6 +4460,563 @@
       <dsp:cNvGrpSpPr/>
     </dsp:nvGrpSpPr>
     <dsp:grpSpPr/>
+    <dsp:sp modelId="{30AD077F-A640-4C8D-ACDD-5CDC4CC1F1ED}">
+      <dsp:nvSpPr>
+        <dsp:cNvPr id="0" name=""/>
+        <dsp:cNvSpPr/>
+      </dsp:nvSpPr>
+      <dsp:spPr>
+        <a:xfrm>
+          <a:off x="578291" y="1462435"/>
+          <a:ext cx="364555" cy="694656"/>
+        </a:xfrm>
+        <a:custGeom>
+          <a:avLst/>
+          <a:gdLst/>
+          <a:ahLst/>
+          <a:cxnLst/>
+          <a:rect l="0" t="0" r="0" b="0"/>
+          <a:pathLst>
+            <a:path>
+              <a:moveTo>
+                <a:pt x="0" y="0"/>
+              </a:moveTo>
+              <a:lnTo>
+                <a:pt x="182277" y="0"/>
+              </a:lnTo>
+              <a:lnTo>
+                <a:pt x="182277" y="694656"/>
+              </a:lnTo>
+              <a:lnTo>
+                <a:pt x="364555" y="694656"/>
+              </a:lnTo>
+            </a:path>
+          </a:pathLst>
+        </a:custGeom>
+        <a:noFill/>
+        <a:ln w="15875" cap="rnd" cmpd="sng" algn="ctr">
+          <a:solidFill>
+            <a:schemeClr val="accent1">
+              <a:shade val="60000"/>
+              <a:hueOff val="0"/>
+              <a:satOff val="0"/>
+              <a:lumOff val="0"/>
+              <a:alphaOff val="0"/>
+            </a:schemeClr>
+          </a:solidFill>
+          <a:prstDash val="solid"/>
+        </a:ln>
+        <a:effectLst/>
+      </dsp:spPr>
+      <dsp:style>
+        <a:lnRef idx="2">
+          <a:scrgbClr r="0" g="0" b="0"/>
+        </a:lnRef>
+        <a:fillRef idx="0">
+          <a:scrgbClr r="0" g="0" b="0"/>
+        </a:fillRef>
+        <a:effectRef idx="0">
+          <a:scrgbClr r="0" g="0" b="0"/>
+        </a:effectRef>
+        <a:fontRef idx="minor"/>
+      </dsp:style>
+      <dsp:txBody>
+        <a:bodyPr spcFirstLastPara="0" vert="horz" wrap="square" lIns="12700" tIns="0" rIns="12700" bIns="0" numCol="1" spcCol="1270" anchor="ctr" anchorCtr="0">
+          <a:noAutofit/>
+        </a:bodyPr>
+        <a:lstStyle/>
+        <a:p>
+          <a:pPr lvl="0" algn="ctr" defTabSz="222250">
+            <a:lnSpc>
+              <a:spcPct val="90000"/>
+            </a:lnSpc>
+            <a:spcBef>
+              <a:spcPct val="0"/>
+            </a:spcBef>
+            <a:spcAft>
+              <a:spcPct val="35000"/>
+            </a:spcAft>
+          </a:pPr>
+          <a:endParaRPr lang="fr-FR" sz="500" kern="1200"/>
+        </a:p>
+      </dsp:txBody>
+      <dsp:txXfrm>
+        <a:off x="740957" y="1790151"/>
+        <a:ext cx="39225" cy="39225"/>
+      </dsp:txXfrm>
+    </dsp:sp>
+    <dsp:sp modelId="{59BEE61D-4554-450C-8620-D3FBB2760D64}">
+      <dsp:nvSpPr>
+        <dsp:cNvPr id="0" name=""/>
+        <dsp:cNvSpPr/>
+      </dsp:nvSpPr>
+      <dsp:spPr>
+        <a:xfrm>
+          <a:off x="578291" y="1416715"/>
+          <a:ext cx="364555" cy="91440"/>
+        </a:xfrm>
+        <a:custGeom>
+          <a:avLst/>
+          <a:gdLst/>
+          <a:ahLst/>
+          <a:cxnLst/>
+          <a:rect l="0" t="0" r="0" b="0"/>
+          <a:pathLst>
+            <a:path>
+              <a:moveTo>
+                <a:pt x="0" y="45720"/>
+              </a:moveTo>
+              <a:lnTo>
+                <a:pt x="364555" y="45720"/>
+              </a:lnTo>
+            </a:path>
+          </a:pathLst>
+        </a:custGeom>
+        <a:noFill/>
+        <a:ln w="15875" cap="rnd" cmpd="sng" algn="ctr">
+          <a:solidFill>
+            <a:schemeClr val="accent1">
+              <a:shade val="60000"/>
+              <a:hueOff val="0"/>
+              <a:satOff val="0"/>
+              <a:lumOff val="0"/>
+              <a:alphaOff val="0"/>
+            </a:schemeClr>
+          </a:solidFill>
+          <a:prstDash val="solid"/>
+        </a:ln>
+        <a:effectLst/>
+      </dsp:spPr>
+      <dsp:style>
+        <a:lnRef idx="2">
+          <a:scrgbClr r="0" g="0" b="0"/>
+        </a:lnRef>
+        <a:fillRef idx="0">
+          <a:scrgbClr r="0" g="0" b="0"/>
+        </a:fillRef>
+        <a:effectRef idx="0">
+          <a:scrgbClr r="0" g="0" b="0"/>
+        </a:effectRef>
+        <a:fontRef idx="minor"/>
+      </dsp:style>
+      <dsp:txBody>
+        <a:bodyPr spcFirstLastPara="0" vert="horz" wrap="square" lIns="12700" tIns="0" rIns="12700" bIns="0" numCol="1" spcCol="1270" anchor="ctr" anchorCtr="0">
+          <a:noAutofit/>
+        </a:bodyPr>
+        <a:lstStyle/>
+        <a:p>
+          <a:pPr lvl="0" algn="ctr" defTabSz="222250">
+            <a:lnSpc>
+              <a:spcPct val="90000"/>
+            </a:lnSpc>
+            <a:spcBef>
+              <a:spcPct val="0"/>
+            </a:spcBef>
+            <a:spcAft>
+              <a:spcPct val="35000"/>
+            </a:spcAft>
+          </a:pPr>
+          <a:endParaRPr lang="fr-FR" sz="500" kern="1200"/>
+        </a:p>
+      </dsp:txBody>
+      <dsp:txXfrm>
+        <a:off x="751456" y="1453321"/>
+        <a:ext cx="18227" cy="18227"/>
+      </dsp:txXfrm>
+    </dsp:sp>
+    <dsp:sp modelId="{1D0C4A87-823A-4C2B-AD84-56B299D21C42}">
+      <dsp:nvSpPr>
+        <dsp:cNvPr id="0" name=""/>
+        <dsp:cNvSpPr/>
+      </dsp:nvSpPr>
+      <dsp:spPr>
+        <a:xfrm>
+          <a:off x="578291" y="767778"/>
+          <a:ext cx="364555" cy="694656"/>
+        </a:xfrm>
+        <a:custGeom>
+          <a:avLst/>
+          <a:gdLst/>
+          <a:ahLst/>
+          <a:cxnLst/>
+          <a:rect l="0" t="0" r="0" b="0"/>
+          <a:pathLst>
+            <a:path>
+              <a:moveTo>
+                <a:pt x="0" y="694656"/>
+              </a:moveTo>
+              <a:lnTo>
+                <a:pt x="182277" y="694656"/>
+              </a:lnTo>
+              <a:lnTo>
+                <a:pt x="182277" y="0"/>
+              </a:lnTo>
+              <a:lnTo>
+                <a:pt x="364555" y="0"/>
+              </a:lnTo>
+            </a:path>
+          </a:pathLst>
+        </a:custGeom>
+        <a:noFill/>
+        <a:ln w="15875" cap="rnd" cmpd="sng" algn="ctr">
+          <a:solidFill>
+            <a:schemeClr val="accent1">
+              <a:shade val="60000"/>
+              <a:hueOff val="0"/>
+              <a:satOff val="0"/>
+              <a:lumOff val="0"/>
+              <a:alphaOff val="0"/>
+            </a:schemeClr>
+          </a:solidFill>
+          <a:prstDash val="solid"/>
+        </a:ln>
+        <a:effectLst/>
+      </dsp:spPr>
+      <dsp:style>
+        <a:lnRef idx="2">
+          <a:scrgbClr r="0" g="0" b="0"/>
+        </a:lnRef>
+        <a:fillRef idx="0">
+          <a:scrgbClr r="0" g="0" b="0"/>
+        </a:fillRef>
+        <a:effectRef idx="0">
+          <a:scrgbClr r="0" g="0" b="0"/>
+        </a:effectRef>
+        <a:fontRef idx="minor"/>
+      </dsp:style>
+      <dsp:txBody>
+        <a:bodyPr spcFirstLastPara="0" vert="horz" wrap="square" lIns="12700" tIns="0" rIns="12700" bIns="0" numCol="1" spcCol="1270" anchor="ctr" anchorCtr="0">
+          <a:noAutofit/>
+        </a:bodyPr>
+        <a:lstStyle/>
+        <a:p>
+          <a:pPr lvl="0" algn="ctr" defTabSz="222250">
+            <a:lnSpc>
+              <a:spcPct val="90000"/>
+            </a:lnSpc>
+            <a:spcBef>
+              <a:spcPct val="0"/>
+            </a:spcBef>
+            <a:spcAft>
+              <a:spcPct val="35000"/>
+            </a:spcAft>
+          </a:pPr>
+          <a:endParaRPr lang="fr-FR" sz="500" kern="1200"/>
+        </a:p>
+      </dsp:txBody>
+      <dsp:txXfrm>
+        <a:off x="740957" y="1095494"/>
+        <a:ext cx="39225" cy="39225"/>
+      </dsp:txXfrm>
+    </dsp:sp>
+    <dsp:sp modelId="{FA3389E4-42C2-41D1-8545-4559F171C3FB}">
+      <dsp:nvSpPr>
+        <dsp:cNvPr id="0" name=""/>
+        <dsp:cNvSpPr/>
+      </dsp:nvSpPr>
+      <dsp:spPr>
+        <a:xfrm rot="16200000">
+          <a:off x="-1162006" y="1184572"/>
+          <a:ext cx="2924870" cy="555725"/>
+        </a:xfrm>
+        <a:prstGeom prst="rect">
+          <a:avLst/>
+        </a:prstGeom>
+        <a:solidFill>
+          <a:schemeClr val="accent1">
+            <a:hueOff val="0"/>
+            <a:satOff val="0"/>
+            <a:lumOff val="0"/>
+            <a:alphaOff val="0"/>
+          </a:schemeClr>
+        </a:solidFill>
+        <a:ln w="15875" cap="rnd" cmpd="sng" algn="ctr">
+          <a:solidFill>
+            <a:schemeClr val="lt1">
+              <a:hueOff val="0"/>
+              <a:satOff val="0"/>
+              <a:lumOff val="0"/>
+              <a:alphaOff val="0"/>
+            </a:schemeClr>
+          </a:solidFill>
+          <a:prstDash val="solid"/>
+        </a:ln>
+        <a:effectLst/>
+      </dsp:spPr>
+      <dsp:style>
+        <a:lnRef idx="2">
+          <a:scrgbClr r="0" g="0" b="0"/>
+        </a:lnRef>
+        <a:fillRef idx="1">
+          <a:scrgbClr r="0" g="0" b="0"/>
+        </a:fillRef>
+        <a:effectRef idx="0">
+          <a:scrgbClr r="0" g="0" b="0"/>
+        </a:effectRef>
+        <a:fontRef idx="minor">
+          <a:schemeClr val="lt1"/>
+        </a:fontRef>
+      </dsp:style>
+      <dsp:txBody>
+        <a:bodyPr spcFirstLastPara="0" vert="horz" wrap="square" lIns="22860" tIns="22860" rIns="22860" bIns="22860" numCol="1" spcCol="1270" anchor="ctr" anchorCtr="0">
+          <a:noAutofit/>
+        </a:bodyPr>
+        <a:lstStyle/>
+        <a:p>
+          <a:pPr lvl="0" algn="ctr" defTabSz="1600200">
+            <a:lnSpc>
+              <a:spcPct val="90000"/>
+            </a:lnSpc>
+            <a:spcBef>
+              <a:spcPct val="0"/>
+            </a:spcBef>
+            <a:spcAft>
+              <a:spcPct val="35000"/>
+            </a:spcAft>
+          </a:pPr>
+          <a:r>
+            <a:rPr lang="fr-FR" sz="3600" kern="1200" dirty="0" smtClean="0"/>
+            <a:t>CSV</a:t>
+          </a:r>
+          <a:endParaRPr lang="fr-FR" sz="3600" kern="1200" dirty="0"/>
+        </a:p>
+      </dsp:txBody>
+      <dsp:txXfrm>
+        <a:off x="-1162006" y="1184572"/>
+        <a:ext cx="2924870" cy="555725"/>
+      </dsp:txXfrm>
+    </dsp:sp>
+    <dsp:sp modelId="{6448E817-BCC3-44AF-A07F-6E7BD25432C6}">
+      <dsp:nvSpPr>
+        <dsp:cNvPr id="0" name=""/>
+        <dsp:cNvSpPr/>
+      </dsp:nvSpPr>
+      <dsp:spPr>
+        <a:xfrm>
+          <a:off x="942847" y="489915"/>
+          <a:ext cx="1822779" cy="555725"/>
+        </a:xfrm>
+        <a:prstGeom prst="rect">
+          <a:avLst/>
+        </a:prstGeom>
+        <a:solidFill>
+          <a:schemeClr val="accent1">
+            <a:hueOff val="0"/>
+            <a:satOff val="0"/>
+            <a:lumOff val="0"/>
+            <a:alphaOff val="0"/>
+          </a:schemeClr>
+        </a:solidFill>
+        <a:ln w="15875" cap="rnd" cmpd="sng" algn="ctr">
+          <a:solidFill>
+            <a:schemeClr val="lt1">
+              <a:hueOff val="0"/>
+              <a:satOff val="0"/>
+              <a:lumOff val="0"/>
+              <a:alphaOff val="0"/>
+            </a:schemeClr>
+          </a:solidFill>
+          <a:prstDash val="solid"/>
+        </a:ln>
+        <a:effectLst/>
+      </dsp:spPr>
+      <dsp:style>
+        <a:lnRef idx="2">
+          <a:scrgbClr r="0" g="0" b="0"/>
+        </a:lnRef>
+        <a:fillRef idx="1">
+          <a:scrgbClr r="0" g="0" b="0"/>
+        </a:fillRef>
+        <a:effectRef idx="0">
+          <a:scrgbClr r="0" g="0" b="0"/>
+        </a:effectRef>
+        <a:fontRef idx="minor">
+          <a:schemeClr val="lt1"/>
+        </a:fontRef>
+      </dsp:style>
+      <dsp:txBody>
+        <a:bodyPr spcFirstLastPara="0" vert="horz" wrap="square" lIns="13335" tIns="13335" rIns="13335" bIns="13335" numCol="1" spcCol="1270" anchor="ctr" anchorCtr="0">
+          <a:noAutofit/>
+        </a:bodyPr>
+        <a:lstStyle/>
+        <a:p>
+          <a:pPr lvl="0" algn="ctr" defTabSz="933450">
+            <a:lnSpc>
+              <a:spcPct val="90000"/>
+            </a:lnSpc>
+            <a:spcBef>
+              <a:spcPct val="0"/>
+            </a:spcBef>
+            <a:spcAft>
+              <a:spcPct val="35000"/>
+            </a:spcAft>
+          </a:pPr>
+          <a:r>
+            <a:rPr lang="fr-FR" sz="2100" kern="1200" dirty="0" smtClean="0"/>
+            <a:t>1896-Summer</a:t>
+          </a:r>
+          <a:endParaRPr lang="fr-FR" sz="2100" kern="1200" dirty="0"/>
+        </a:p>
+      </dsp:txBody>
+      <dsp:txXfrm>
+        <a:off x="942847" y="489915"/>
+        <a:ext cx="1822779" cy="555725"/>
+      </dsp:txXfrm>
+    </dsp:sp>
+    <dsp:sp modelId="{6BB11F93-5948-4438-9748-48AFADC94B69}">
+      <dsp:nvSpPr>
+        <dsp:cNvPr id="0" name=""/>
+        <dsp:cNvSpPr/>
+      </dsp:nvSpPr>
+      <dsp:spPr>
+        <a:xfrm>
+          <a:off x="942847" y="1184572"/>
+          <a:ext cx="1822779" cy="555725"/>
+        </a:xfrm>
+        <a:prstGeom prst="rect">
+          <a:avLst/>
+        </a:prstGeom>
+        <a:solidFill>
+          <a:schemeClr val="accent1">
+            <a:hueOff val="0"/>
+            <a:satOff val="0"/>
+            <a:lumOff val="0"/>
+            <a:alphaOff val="0"/>
+          </a:schemeClr>
+        </a:solidFill>
+        <a:ln w="15875" cap="rnd" cmpd="sng" algn="ctr">
+          <a:solidFill>
+            <a:schemeClr val="lt1">
+              <a:hueOff val="0"/>
+              <a:satOff val="0"/>
+              <a:lumOff val="0"/>
+              <a:alphaOff val="0"/>
+            </a:schemeClr>
+          </a:solidFill>
+          <a:prstDash val="solid"/>
+        </a:ln>
+        <a:effectLst/>
+      </dsp:spPr>
+      <dsp:style>
+        <a:lnRef idx="2">
+          <a:scrgbClr r="0" g="0" b="0"/>
+        </a:lnRef>
+        <a:fillRef idx="1">
+          <a:scrgbClr r="0" g="0" b="0"/>
+        </a:fillRef>
+        <a:effectRef idx="0">
+          <a:scrgbClr r="0" g="0" b="0"/>
+        </a:effectRef>
+        <a:fontRef idx="minor">
+          <a:schemeClr val="lt1"/>
+        </a:fontRef>
+      </dsp:style>
+      <dsp:txBody>
+        <a:bodyPr spcFirstLastPara="0" vert="horz" wrap="square" lIns="13335" tIns="13335" rIns="13335" bIns="13335" numCol="1" spcCol="1270" anchor="ctr" anchorCtr="0">
+          <a:noAutofit/>
+        </a:bodyPr>
+        <a:lstStyle/>
+        <a:p>
+          <a:pPr lvl="0" algn="ctr" defTabSz="933450">
+            <a:lnSpc>
+              <a:spcPct val="90000"/>
+            </a:lnSpc>
+            <a:spcBef>
+              <a:spcPct val="0"/>
+            </a:spcBef>
+            <a:spcAft>
+              <a:spcPct val="35000"/>
+            </a:spcAft>
+          </a:pPr>
+          <a:r>
+            <a:rPr lang="fr-FR" sz="2100" kern="1200" dirty="0" smtClean="0"/>
+            <a:t>…….</a:t>
+          </a:r>
+          <a:endParaRPr lang="fr-FR" sz="2100" kern="1200" dirty="0"/>
+        </a:p>
+      </dsp:txBody>
+      <dsp:txXfrm>
+        <a:off x="942847" y="1184572"/>
+        <a:ext cx="1822779" cy="555725"/>
+      </dsp:txXfrm>
+    </dsp:sp>
+    <dsp:sp modelId="{5BC0F9F4-EBC1-463C-AE61-0E149E19151D}">
+      <dsp:nvSpPr>
+        <dsp:cNvPr id="0" name=""/>
+        <dsp:cNvSpPr/>
+      </dsp:nvSpPr>
+      <dsp:spPr>
+        <a:xfrm>
+          <a:off x="942847" y="1879229"/>
+          <a:ext cx="1822779" cy="555725"/>
+        </a:xfrm>
+        <a:prstGeom prst="rect">
+          <a:avLst/>
+        </a:prstGeom>
+        <a:solidFill>
+          <a:schemeClr val="accent1">
+            <a:hueOff val="0"/>
+            <a:satOff val="0"/>
+            <a:lumOff val="0"/>
+            <a:alphaOff val="0"/>
+          </a:schemeClr>
+        </a:solidFill>
+        <a:ln w="15875" cap="rnd" cmpd="sng" algn="ctr">
+          <a:solidFill>
+            <a:schemeClr val="lt1">
+              <a:hueOff val="0"/>
+              <a:satOff val="0"/>
+              <a:lumOff val="0"/>
+              <a:alphaOff val="0"/>
+            </a:schemeClr>
+          </a:solidFill>
+          <a:prstDash val="solid"/>
+        </a:ln>
+        <a:effectLst/>
+      </dsp:spPr>
+      <dsp:style>
+        <a:lnRef idx="2">
+          <a:scrgbClr r="0" g="0" b="0"/>
+        </a:lnRef>
+        <a:fillRef idx="1">
+          <a:scrgbClr r="0" g="0" b="0"/>
+        </a:fillRef>
+        <a:effectRef idx="0">
+          <a:scrgbClr r="0" g="0" b="0"/>
+        </a:effectRef>
+        <a:fontRef idx="minor">
+          <a:schemeClr val="lt1"/>
+        </a:fontRef>
+      </dsp:style>
+      <dsp:txBody>
+        <a:bodyPr spcFirstLastPara="0" vert="horz" wrap="square" lIns="13335" tIns="13335" rIns="13335" bIns="13335" numCol="1" spcCol="1270" anchor="ctr" anchorCtr="0">
+          <a:noAutofit/>
+        </a:bodyPr>
+        <a:lstStyle/>
+        <a:p>
+          <a:pPr lvl="0" algn="ctr" defTabSz="933450">
+            <a:lnSpc>
+              <a:spcPct val="90000"/>
+            </a:lnSpc>
+            <a:spcBef>
+              <a:spcPct val="0"/>
+            </a:spcBef>
+            <a:spcAft>
+              <a:spcPct val="35000"/>
+            </a:spcAft>
+          </a:pPr>
+          <a:r>
+            <a:rPr lang="fr-FR" sz="2100" kern="1200" dirty="0" smtClean="0"/>
+            <a:t>2008-Winter</a:t>
+          </a:r>
+          <a:endParaRPr lang="fr-FR" sz="2100" kern="1200" dirty="0"/>
+        </a:p>
+      </dsp:txBody>
+      <dsp:txXfrm>
+        <a:off x="942847" y="1879229"/>
+        <a:ext cx="1822779" cy="555725"/>
+      </dsp:txXfrm>
+    </dsp:sp>
   </dsp:spTree>
 </dsp:drawing>
 </file>
@@ -4472,6 +5029,414 @@
       <dsp:cNvGrpSpPr/>
     </dsp:nvGrpSpPr>
     <dsp:grpSpPr/>
+    <dsp:sp modelId="{4B9C6779-953B-4991-985A-1595B1BEFA70}">
+      <dsp:nvSpPr>
+        <dsp:cNvPr id="0" name=""/>
+        <dsp:cNvSpPr/>
+      </dsp:nvSpPr>
+      <dsp:spPr>
+        <a:xfrm>
+          <a:off x="2649" y="283222"/>
+          <a:ext cx="1320667" cy="1796722"/>
+        </a:xfrm>
+        <a:prstGeom prst="roundRect">
+          <a:avLst>
+            <a:gd name="adj" fmla="val 10000"/>
+          </a:avLst>
+        </a:prstGeom>
+        <a:solidFill>
+          <a:schemeClr val="accent6"/>
+        </a:solidFill>
+        <a:ln w="15875" cap="rnd" cmpd="sng" algn="ctr">
+          <a:solidFill>
+            <a:schemeClr val="lt1">
+              <a:hueOff val="0"/>
+              <a:satOff val="0"/>
+              <a:lumOff val="0"/>
+              <a:alphaOff val="0"/>
+            </a:schemeClr>
+          </a:solidFill>
+          <a:prstDash val="solid"/>
+        </a:ln>
+        <a:effectLst/>
+      </dsp:spPr>
+      <dsp:style>
+        <a:lnRef idx="2">
+          <a:scrgbClr r="0" g="0" b="0"/>
+        </a:lnRef>
+        <a:fillRef idx="1">
+          <a:scrgbClr r="0" g="0" b="0"/>
+        </a:fillRef>
+        <a:effectRef idx="0">
+          <a:scrgbClr r="0" g="0" b="0"/>
+        </a:effectRef>
+        <a:fontRef idx="minor">
+          <a:schemeClr val="lt1"/>
+        </a:fontRef>
+      </dsp:style>
+      <dsp:txBody>
+        <a:bodyPr spcFirstLastPara="0" vert="horz" wrap="square" lIns="53340" tIns="53340" rIns="53340" bIns="53340" numCol="1" spcCol="1270" anchor="ctr" anchorCtr="0">
+          <a:noAutofit/>
+        </a:bodyPr>
+        <a:lstStyle/>
+        <a:p>
+          <a:pPr lvl="0" algn="ctr" defTabSz="622300">
+            <a:lnSpc>
+              <a:spcPct val="90000"/>
+            </a:lnSpc>
+            <a:spcBef>
+              <a:spcPct val="0"/>
+            </a:spcBef>
+            <a:spcAft>
+              <a:spcPct val="35000"/>
+            </a:spcAft>
+          </a:pPr>
+          <a:r>
+            <a:rPr lang="fr-FR" sz="1400" kern="1200" dirty="0" err="1" smtClean="0"/>
+            <a:t>External</a:t>
+          </a:r>
+          <a:r>
+            <a:rPr lang="fr-FR" sz="1400" kern="1200" dirty="0" smtClean="0"/>
+            <a:t> table:</a:t>
+          </a:r>
+        </a:p>
+        <a:p>
+          <a:pPr lvl="0" algn="ctr" defTabSz="622300">
+            <a:lnSpc>
+              <a:spcPct val="90000"/>
+            </a:lnSpc>
+            <a:spcBef>
+              <a:spcPct val="0"/>
+            </a:spcBef>
+            <a:spcAft>
+              <a:spcPct val="35000"/>
+            </a:spcAft>
+          </a:pPr>
+          <a:r>
+            <a:rPr lang="fr-FR" sz="1400" kern="1200" dirty="0" smtClean="0"/>
+            <a:t>JO-full-</a:t>
+          </a:r>
+          <a:r>
+            <a:rPr lang="fr-FR" sz="1400" kern="1200" dirty="0" err="1" smtClean="0"/>
+            <a:t>games</a:t>
+          </a:r>
+          <a:endParaRPr lang="fr-FR" sz="1400" kern="1200" dirty="0" smtClean="0"/>
+        </a:p>
+        <a:p>
+          <a:pPr lvl="0" algn="ctr" defTabSz="622300">
+            <a:lnSpc>
+              <a:spcPct val="90000"/>
+            </a:lnSpc>
+            <a:spcBef>
+              <a:spcPct val="0"/>
+            </a:spcBef>
+            <a:spcAft>
+              <a:spcPct val="35000"/>
+            </a:spcAft>
+          </a:pPr>
+          <a:endParaRPr lang="fr-FR" sz="1100" kern="1200" dirty="0"/>
+        </a:p>
+      </dsp:txBody>
+      <dsp:txXfrm>
+        <a:off x="41330" y="321903"/>
+        <a:ext cx="1243305" cy="1719360"/>
+      </dsp:txXfrm>
+    </dsp:sp>
+    <dsp:sp modelId="{E6F5F085-2481-4AB4-A71F-EE6F25E12BC4}">
+      <dsp:nvSpPr>
+        <dsp:cNvPr id="0" name=""/>
+        <dsp:cNvSpPr/>
+      </dsp:nvSpPr>
+      <dsp:spPr>
+        <a:xfrm rot="21013006" flipV="1">
+          <a:off x="1392988" y="730713"/>
+          <a:ext cx="720241" cy="122930"/>
+        </a:xfrm>
+        <a:prstGeom prst="rightArrow">
+          <a:avLst>
+            <a:gd name="adj1" fmla="val 60000"/>
+            <a:gd name="adj2" fmla="val 50000"/>
+          </a:avLst>
+        </a:prstGeom>
+        <a:solidFill>
+          <a:schemeClr val="accent1">
+            <a:tint val="60000"/>
+            <a:hueOff val="0"/>
+            <a:satOff val="0"/>
+            <a:lumOff val="0"/>
+            <a:alphaOff val="0"/>
+          </a:schemeClr>
+        </a:solidFill>
+        <a:ln>
+          <a:noFill/>
+        </a:ln>
+        <a:effectLst/>
+      </dsp:spPr>
+      <dsp:style>
+        <a:lnRef idx="0">
+          <a:scrgbClr r="0" g="0" b="0"/>
+        </a:lnRef>
+        <a:fillRef idx="1">
+          <a:scrgbClr r="0" g="0" b="0"/>
+        </a:fillRef>
+        <a:effectRef idx="0">
+          <a:scrgbClr r="0" g="0" b="0"/>
+        </a:effectRef>
+        <a:fontRef idx="minor">
+          <a:schemeClr val="lt1"/>
+        </a:fontRef>
+      </dsp:style>
+      <dsp:txBody>
+        <a:bodyPr spcFirstLastPara="0" vert="horz" wrap="square" lIns="0" tIns="0" rIns="0" bIns="0" numCol="1" spcCol="1270" anchor="ctr" anchorCtr="0">
+          <a:noAutofit/>
+        </a:bodyPr>
+        <a:lstStyle/>
+        <a:p>
+          <a:pPr lvl="0" algn="ctr" defTabSz="222250">
+            <a:lnSpc>
+              <a:spcPct val="90000"/>
+            </a:lnSpc>
+            <a:spcBef>
+              <a:spcPct val="0"/>
+            </a:spcBef>
+            <a:spcAft>
+              <a:spcPct val="35000"/>
+            </a:spcAft>
+          </a:pPr>
+          <a:endParaRPr lang="fr-FR" sz="500" kern="1200"/>
+        </a:p>
+      </dsp:txBody>
+      <dsp:txXfrm rot="-10800000">
+        <a:off x="1393256" y="758432"/>
+        <a:ext cx="683362" cy="73758"/>
+      </dsp:txXfrm>
+    </dsp:sp>
+    <dsp:sp modelId="{89A8B5B1-2F25-45A7-A616-B5F8B8D78AB4}">
+      <dsp:nvSpPr>
+        <dsp:cNvPr id="0" name=""/>
+        <dsp:cNvSpPr/>
+      </dsp:nvSpPr>
+      <dsp:spPr>
+        <a:xfrm>
+          <a:off x="2157865" y="0"/>
+          <a:ext cx="999241" cy="1276117"/>
+        </a:xfrm>
+        <a:prstGeom prst="roundRect">
+          <a:avLst>
+            <a:gd name="adj" fmla="val 10000"/>
+          </a:avLst>
+        </a:prstGeom>
+        <a:solidFill>
+          <a:schemeClr val="accent1">
+            <a:hueOff val="0"/>
+            <a:satOff val="0"/>
+            <a:lumOff val="0"/>
+            <a:alphaOff val="0"/>
+          </a:schemeClr>
+        </a:solidFill>
+        <a:ln w="15875" cap="rnd" cmpd="sng" algn="ctr">
+          <a:solidFill>
+            <a:schemeClr val="lt1">
+              <a:hueOff val="0"/>
+              <a:satOff val="0"/>
+              <a:lumOff val="0"/>
+              <a:alphaOff val="0"/>
+            </a:schemeClr>
+          </a:solidFill>
+          <a:prstDash val="solid"/>
+        </a:ln>
+        <a:effectLst/>
+      </dsp:spPr>
+      <dsp:style>
+        <a:lnRef idx="2">
+          <a:scrgbClr r="0" g="0" b="0"/>
+        </a:lnRef>
+        <a:fillRef idx="1">
+          <a:scrgbClr r="0" g="0" b="0"/>
+        </a:fillRef>
+        <a:effectRef idx="0">
+          <a:scrgbClr r="0" g="0" b="0"/>
+        </a:effectRef>
+        <a:fontRef idx="minor">
+          <a:schemeClr val="lt1"/>
+        </a:fontRef>
+      </dsp:style>
+      <dsp:txBody>
+        <a:bodyPr spcFirstLastPara="0" vert="horz" wrap="square" lIns="68580" tIns="68580" rIns="68580" bIns="68580" numCol="1" spcCol="1270" anchor="ctr" anchorCtr="0">
+          <a:noAutofit/>
+        </a:bodyPr>
+        <a:lstStyle/>
+        <a:p>
+          <a:pPr lvl="0" algn="ctr" defTabSz="800100">
+            <a:lnSpc>
+              <a:spcPct val="90000"/>
+            </a:lnSpc>
+            <a:spcBef>
+              <a:spcPct val="0"/>
+            </a:spcBef>
+            <a:spcAft>
+              <a:spcPct val="35000"/>
+            </a:spcAft>
+          </a:pPr>
+          <a:r>
+            <a:rPr lang="fr-FR" sz="1800" kern="1200" dirty="0" smtClean="0"/>
+            <a:t>UC1 Tables</a:t>
+          </a:r>
+        </a:p>
+      </dsp:txBody>
+      <dsp:txXfrm>
+        <a:off x="2187132" y="29267"/>
+        <a:ext cx="940707" cy="1217583"/>
+      </dsp:txXfrm>
+    </dsp:sp>
+    <dsp:sp modelId="{A342AF56-CC7B-4306-A7E5-AE6FFFD8206C}">
+      <dsp:nvSpPr>
+        <dsp:cNvPr id="0" name=""/>
+        <dsp:cNvSpPr/>
+      </dsp:nvSpPr>
+      <dsp:spPr>
+        <a:xfrm rot="1669763">
+          <a:off x="1280986" y="1206603"/>
+          <a:ext cx="780255" cy="129892"/>
+        </a:xfrm>
+        <a:prstGeom prst="rightArrow">
+          <a:avLst>
+            <a:gd name="adj1" fmla="val 60000"/>
+            <a:gd name="adj2" fmla="val 50000"/>
+          </a:avLst>
+        </a:prstGeom>
+        <a:solidFill>
+          <a:schemeClr val="accent1">
+            <a:tint val="60000"/>
+            <a:hueOff val="0"/>
+            <a:satOff val="0"/>
+            <a:lumOff val="0"/>
+            <a:alphaOff val="0"/>
+          </a:schemeClr>
+        </a:solidFill>
+        <a:ln>
+          <a:noFill/>
+        </a:ln>
+        <a:effectLst/>
+      </dsp:spPr>
+      <dsp:style>
+        <a:lnRef idx="0">
+          <a:scrgbClr r="0" g="0" b="0"/>
+        </a:lnRef>
+        <a:fillRef idx="1">
+          <a:scrgbClr r="0" g="0" b="0"/>
+        </a:fillRef>
+        <a:effectRef idx="0">
+          <a:scrgbClr r="0" g="0" b="0"/>
+        </a:effectRef>
+        <a:fontRef idx="minor">
+          <a:schemeClr val="lt1"/>
+        </a:fontRef>
+      </dsp:style>
+      <dsp:txBody>
+        <a:bodyPr spcFirstLastPara="0" vert="horz" wrap="square" lIns="0" tIns="0" rIns="0" bIns="0" numCol="1" spcCol="1270" anchor="ctr" anchorCtr="0">
+          <a:noAutofit/>
+        </a:bodyPr>
+        <a:lstStyle/>
+        <a:p>
+          <a:pPr lvl="0" algn="ctr" defTabSz="222250">
+            <a:lnSpc>
+              <a:spcPct val="90000"/>
+            </a:lnSpc>
+            <a:spcBef>
+              <a:spcPct val="0"/>
+            </a:spcBef>
+            <a:spcAft>
+              <a:spcPct val="35000"/>
+            </a:spcAft>
+          </a:pPr>
+          <a:endParaRPr lang="fr-FR" sz="500" kern="1200" dirty="0"/>
+        </a:p>
+      </dsp:txBody>
+      <dsp:txXfrm>
+        <a:off x="1283239" y="1223485"/>
+        <a:ext cx="741287" cy="77936"/>
+      </dsp:txXfrm>
+    </dsp:sp>
+    <dsp:sp modelId="{E395E9E1-5A10-43A6-99C0-4FD42F918A38}">
+      <dsp:nvSpPr>
+        <dsp:cNvPr id="0" name=""/>
+        <dsp:cNvSpPr/>
+      </dsp:nvSpPr>
+      <dsp:spPr>
+        <a:xfrm>
+          <a:off x="2217143" y="1373296"/>
+          <a:ext cx="1108141" cy="989871"/>
+        </a:xfrm>
+        <a:prstGeom prst="roundRect">
+          <a:avLst>
+            <a:gd name="adj" fmla="val 10000"/>
+          </a:avLst>
+        </a:prstGeom>
+        <a:solidFill>
+          <a:schemeClr val="accent1">
+            <a:hueOff val="0"/>
+            <a:satOff val="0"/>
+            <a:lumOff val="0"/>
+            <a:alphaOff val="0"/>
+          </a:schemeClr>
+        </a:solidFill>
+        <a:ln w="15875" cap="rnd" cmpd="sng" algn="ctr">
+          <a:solidFill>
+            <a:schemeClr val="lt1">
+              <a:hueOff val="0"/>
+              <a:satOff val="0"/>
+              <a:lumOff val="0"/>
+              <a:alphaOff val="0"/>
+            </a:schemeClr>
+          </a:solidFill>
+          <a:prstDash val="solid"/>
+        </a:ln>
+        <a:effectLst/>
+      </dsp:spPr>
+      <dsp:style>
+        <a:lnRef idx="2">
+          <a:scrgbClr r="0" g="0" b="0"/>
+        </a:lnRef>
+        <a:fillRef idx="1">
+          <a:scrgbClr r="0" g="0" b="0"/>
+        </a:fillRef>
+        <a:effectRef idx="0">
+          <a:scrgbClr r="0" g="0" b="0"/>
+        </a:effectRef>
+        <a:fontRef idx="minor">
+          <a:schemeClr val="lt1"/>
+        </a:fontRef>
+      </dsp:style>
+      <dsp:txBody>
+        <a:bodyPr spcFirstLastPara="0" vert="horz" wrap="square" lIns="68580" tIns="68580" rIns="68580" bIns="68580" numCol="1" spcCol="1270" anchor="ctr" anchorCtr="0">
+          <a:noAutofit/>
+        </a:bodyPr>
+        <a:lstStyle/>
+        <a:p>
+          <a:pPr lvl="0" algn="ctr" defTabSz="800100">
+            <a:lnSpc>
+              <a:spcPct val="90000"/>
+            </a:lnSpc>
+            <a:spcBef>
+              <a:spcPct val="0"/>
+            </a:spcBef>
+            <a:spcAft>
+              <a:spcPct val="35000"/>
+            </a:spcAft>
+          </a:pPr>
+          <a:r>
+            <a:rPr lang="fr-FR" sz="1800" kern="1200" dirty="0" smtClean="0"/>
+            <a:t>UC2 Tables</a:t>
+          </a:r>
+          <a:endParaRPr lang="fr-FR" sz="1800" kern="1200" dirty="0"/>
+        </a:p>
+      </dsp:txBody>
+      <dsp:txXfrm>
+        <a:off x="2246135" y="1402288"/>
+        <a:ext cx="1050157" cy="931887"/>
+      </dsp:txXfrm>
+    </dsp:sp>
   </dsp:spTree>
 </dsp:drawing>
 </file>
@@ -4484,6 +5449,563 @@
       <dsp:cNvGrpSpPr/>
     </dsp:nvGrpSpPr>
     <dsp:grpSpPr/>
+    <dsp:sp modelId="{6CDB3343-0039-447E-BF66-BB6196631A06}">
+      <dsp:nvSpPr>
+        <dsp:cNvPr id="0" name=""/>
+        <dsp:cNvSpPr/>
+      </dsp:nvSpPr>
+      <dsp:spPr>
+        <a:xfrm>
+          <a:off x="340121" y="1123406"/>
+          <a:ext cx="221574" cy="422208"/>
+        </a:xfrm>
+        <a:custGeom>
+          <a:avLst/>
+          <a:gdLst/>
+          <a:ahLst/>
+          <a:cxnLst/>
+          <a:rect l="0" t="0" r="0" b="0"/>
+          <a:pathLst>
+            <a:path>
+              <a:moveTo>
+                <a:pt x="0" y="0"/>
+              </a:moveTo>
+              <a:lnTo>
+                <a:pt x="110787" y="0"/>
+              </a:lnTo>
+              <a:lnTo>
+                <a:pt x="110787" y="422208"/>
+              </a:lnTo>
+              <a:lnTo>
+                <a:pt x="221574" y="422208"/>
+              </a:lnTo>
+            </a:path>
+          </a:pathLst>
+        </a:custGeom>
+        <a:noFill/>
+        <a:ln w="15875" cap="rnd" cmpd="sng" algn="ctr">
+          <a:solidFill>
+            <a:schemeClr val="accent1">
+              <a:shade val="60000"/>
+              <a:hueOff val="0"/>
+              <a:satOff val="0"/>
+              <a:lumOff val="0"/>
+              <a:alphaOff val="0"/>
+            </a:schemeClr>
+          </a:solidFill>
+          <a:prstDash val="solid"/>
+        </a:ln>
+        <a:effectLst/>
+      </dsp:spPr>
+      <dsp:style>
+        <a:lnRef idx="2">
+          <a:scrgbClr r="0" g="0" b="0"/>
+        </a:lnRef>
+        <a:fillRef idx="0">
+          <a:scrgbClr r="0" g="0" b="0"/>
+        </a:fillRef>
+        <a:effectRef idx="0">
+          <a:scrgbClr r="0" g="0" b="0"/>
+        </a:effectRef>
+        <a:fontRef idx="minor"/>
+      </dsp:style>
+      <dsp:txBody>
+        <a:bodyPr spcFirstLastPara="0" vert="horz" wrap="square" lIns="12700" tIns="0" rIns="12700" bIns="0" numCol="1" spcCol="1270" anchor="ctr" anchorCtr="0">
+          <a:noAutofit/>
+        </a:bodyPr>
+        <a:lstStyle/>
+        <a:p>
+          <a:pPr lvl="0" algn="ctr" defTabSz="222250">
+            <a:lnSpc>
+              <a:spcPct val="90000"/>
+            </a:lnSpc>
+            <a:spcBef>
+              <a:spcPct val="0"/>
+            </a:spcBef>
+            <a:spcAft>
+              <a:spcPct val="35000"/>
+            </a:spcAft>
+          </a:pPr>
+          <a:endParaRPr lang="fr-FR" sz="500" kern="1200"/>
+        </a:p>
+      </dsp:txBody>
+      <dsp:txXfrm>
+        <a:off x="438988" y="1322589"/>
+        <a:ext cx="23840" cy="23840"/>
+      </dsp:txXfrm>
+    </dsp:sp>
+    <dsp:sp modelId="{8847ABB5-E5C3-46CE-9AC3-3484602202C6}">
+      <dsp:nvSpPr>
+        <dsp:cNvPr id="0" name=""/>
+        <dsp:cNvSpPr/>
+      </dsp:nvSpPr>
+      <dsp:spPr>
+        <a:xfrm>
+          <a:off x="340121" y="1077686"/>
+          <a:ext cx="221574" cy="91440"/>
+        </a:xfrm>
+        <a:custGeom>
+          <a:avLst/>
+          <a:gdLst/>
+          <a:ahLst/>
+          <a:cxnLst/>
+          <a:rect l="0" t="0" r="0" b="0"/>
+          <a:pathLst>
+            <a:path>
+              <a:moveTo>
+                <a:pt x="0" y="45720"/>
+              </a:moveTo>
+              <a:lnTo>
+                <a:pt x="221574" y="45720"/>
+              </a:lnTo>
+            </a:path>
+          </a:pathLst>
+        </a:custGeom>
+        <a:noFill/>
+        <a:ln w="15875" cap="rnd" cmpd="sng" algn="ctr">
+          <a:solidFill>
+            <a:schemeClr val="accent1">
+              <a:shade val="60000"/>
+              <a:hueOff val="0"/>
+              <a:satOff val="0"/>
+              <a:lumOff val="0"/>
+              <a:alphaOff val="0"/>
+            </a:schemeClr>
+          </a:solidFill>
+          <a:prstDash val="solid"/>
+        </a:ln>
+        <a:effectLst/>
+      </dsp:spPr>
+      <dsp:style>
+        <a:lnRef idx="2">
+          <a:scrgbClr r="0" g="0" b="0"/>
+        </a:lnRef>
+        <a:fillRef idx="0">
+          <a:scrgbClr r="0" g="0" b="0"/>
+        </a:fillRef>
+        <a:effectRef idx="0">
+          <a:scrgbClr r="0" g="0" b="0"/>
+        </a:effectRef>
+        <a:fontRef idx="minor"/>
+      </dsp:style>
+      <dsp:txBody>
+        <a:bodyPr spcFirstLastPara="0" vert="horz" wrap="square" lIns="12700" tIns="0" rIns="12700" bIns="0" numCol="1" spcCol="1270" anchor="ctr" anchorCtr="0">
+          <a:noAutofit/>
+        </a:bodyPr>
+        <a:lstStyle/>
+        <a:p>
+          <a:pPr lvl="0" algn="ctr" defTabSz="222250">
+            <a:lnSpc>
+              <a:spcPct val="90000"/>
+            </a:lnSpc>
+            <a:spcBef>
+              <a:spcPct val="0"/>
+            </a:spcBef>
+            <a:spcAft>
+              <a:spcPct val="35000"/>
+            </a:spcAft>
+          </a:pPr>
+          <a:endParaRPr lang="fr-FR" sz="500" kern="1200"/>
+        </a:p>
+      </dsp:txBody>
+      <dsp:txXfrm>
+        <a:off x="445369" y="1117866"/>
+        <a:ext cx="11078" cy="11078"/>
+      </dsp:txXfrm>
+    </dsp:sp>
+    <dsp:sp modelId="{A4C94C7A-2569-4E41-9038-4698909CAAF8}">
+      <dsp:nvSpPr>
+        <dsp:cNvPr id="0" name=""/>
+        <dsp:cNvSpPr/>
+      </dsp:nvSpPr>
+      <dsp:spPr>
+        <a:xfrm>
+          <a:off x="340121" y="701197"/>
+          <a:ext cx="221574" cy="422208"/>
+        </a:xfrm>
+        <a:custGeom>
+          <a:avLst/>
+          <a:gdLst/>
+          <a:ahLst/>
+          <a:cxnLst/>
+          <a:rect l="0" t="0" r="0" b="0"/>
+          <a:pathLst>
+            <a:path>
+              <a:moveTo>
+                <a:pt x="0" y="422208"/>
+              </a:moveTo>
+              <a:lnTo>
+                <a:pt x="110787" y="422208"/>
+              </a:lnTo>
+              <a:lnTo>
+                <a:pt x="110787" y="0"/>
+              </a:lnTo>
+              <a:lnTo>
+                <a:pt x="221574" y="0"/>
+              </a:lnTo>
+            </a:path>
+          </a:pathLst>
+        </a:custGeom>
+        <a:noFill/>
+        <a:ln w="15875" cap="rnd" cmpd="sng" algn="ctr">
+          <a:solidFill>
+            <a:schemeClr val="accent1">
+              <a:shade val="60000"/>
+              <a:hueOff val="0"/>
+              <a:satOff val="0"/>
+              <a:lumOff val="0"/>
+              <a:alphaOff val="0"/>
+            </a:schemeClr>
+          </a:solidFill>
+          <a:prstDash val="solid"/>
+        </a:ln>
+        <a:effectLst/>
+      </dsp:spPr>
+      <dsp:style>
+        <a:lnRef idx="2">
+          <a:scrgbClr r="0" g="0" b="0"/>
+        </a:lnRef>
+        <a:fillRef idx="0">
+          <a:scrgbClr r="0" g="0" b="0"/>
+        </a:fillRef>
+        <a:effectRef idx="0">
+          <a:scrgbClr r="0" g="0" b="0"/>
+        </a:effectRef>
+        <a:fontRef idx="minor"/>
+      </dsp:style>
+      <dsp:txBody>
+        <a:bodyPr spcFirstLastPara="0" vert="horz" wrap="square" lIns="12700" tIns="0" rIns="12700" bIns="0" numCol="1" spcCol="1270" anchor="ctr" anchorCtr="0">
+          <a:noAutofit/>
+        </a:bodyPr>
+        <a:lstStyle/>
+        <a:p>
+          <a:pPr lvl="0" algn="ctr" defTabSz="222250">
+            <a:lnSpc>
+              <a:spcPct val="90000"/>
+            </a:lnSpc>
+            <a:spcBef>
+              <a:spcPct val="0"/>
+            </a:spcBef>
+            <a:spcAft>
+              <a:spcPct val="35000"/>
+            </a:spcAft>
+          </a:pPr>
+          <a:endParaRPr lang="fr-FR" sz="500" kern="1200"/>
+        </a:p>
+      </dsp:txBody>
+      <dsp:txXfrm>
+        <a:off x="438988" y="900381"/>
+        <a:ext cx="23840" cy="23840"/>
+      </dsp:txXfrm>
+    </dsp:sp>
+    <dsp:sp modelId="{0147A71A-F228-43BB-9C0D-73A91C7FBF49}">
+      <dsp:nvSpPr>
+        <dsp:cNvPr id="0" name=""/>
+        <dsp:cNvSpPr/>
+      </dsp:nvSpPr>
+      <dsp:spPr>
+        <a:xfrm rot="16200000">
+          <a:off x="-717621" y="954522"/>
+          <a:ext cx="1777719" cy="337766"/>
+        </a:xfrm>
+        <a:prstGeom prst="rect">
+          <a:avLst/>
+        </a:prstGeom>
+        <a:solidFill>
+          <a:schemeClr val="accent1">
+            <a:hueOff val="0"/>
+            <a:satOff val="0"/>
+            <a:lumOff val="0"/>
+            <a:alphaOff val="0"/>
+          </a:schemeClr>
+        </a:solidFill>
+        <a:ln w="15875" cap="rnd" cmpd="sng" algn="ctr">
+          <a:solidFill>
+            <a:schemeClr val="lt1">
+              <a:hueOff val="0"/>
+              <a:satOff val="0"/>
+              <a:lumOff val="0"/>
+              <a:alphaOff val="0"/>
+            </a:schemeClr>
+          </a:solidFill>
+          <a:prstDash val="solid"/>
+        </a:ln>
+        <a:effectLst/>
+      </dsp:spPr>
+      <dsp:style>
+        <a:lnRef idx="2">
+          <a:scrgbClr r="0" g="0" b="0"/>
+        </a:lnRef>
+        <a:fillRef idx="1">
+          <a:scrgbClr r="0" g="0" b="0"/>
+        </a:fillRef>
+        <a:effectRef idx="0">
+          <a:scrgbClr r="0" g="0" b="0"/>
+        </a:effectRef>
+        <a:fontRef idx="minor">
+          <a:schemeClr val="lt1"/>
+        </a:fontRef>
+      </dsp:style>
+      <dsp:txBody>
+        <a:bodyPr spcFirstLastPara="0" vert="horz" wrap="square" lIns="13970" tIns="13970" rIns="13970" bIns="13970" numCol="1" spcCol="1270" anchor="ctr" anchorCtr="0">
+          <a:noAutofit/>
+        </a:bodyPr>
+        <a:lstStyle/>
+        <a:p>
+          <a:pPr lvl="0" algn="ctr" defTabSz="977900">
+            <a:lnSpc>
+              <a:spcPct val="90000"/>
+            </a:lnSpc>
+            <a:spcBef>
+              <a:spcPct val="0"/>
+            </a:spcBef>
+            <a:spcAft>
+              <a:spcPct val="35000"/>
+            </a:spcAft>
+          </a:pPr>
+          <a:r>
+            <a:rPr lang="fr-FR" sz="2200" kern="1200" dirty="0" smtClean="0"/>
+            <a:t>Tables UC2</a:t>
+          </a:r>
+          <a:endParaRPr lang="fr-FR" sz="2200" kern="1200" dirty="0"/>
+        </a:p>
+      </dsp:txBody>
+      <dsp:txXfrm>
+        <a:off x="-717621" y="954522"/>
+        <a:ext cx="1777719" cy="337766"/>
+      </dsp:txXfrm>
+    </dsp:sp>
+    <dsp:sp modelId="{1CEB2D26-647B-4511-B381-49FD29B10430}">
+      <dsp:nvSpPr>
+        <dsp:cNvPr id="0" name=""/>
+        <dsp:cNvSpPr/>
+      </dsp:nvSpPr>
+      <dsp:spPr>
+        <a:xfrm>
+          <a:off x="561696" y="532314"/>
+          <a:ext cx="2811975" cy="337766"/>
+        </a:xfrm>
+        <a:prstGeom prst="rect">
+          <a:avLst/>
+        </a:prstGeom>
+        <a:solidFill>
+          <a:schemeClr val="accent1">
+            <a:hueOff val="0"/>
+            <a:satOff val="0"/>
+            <a:lumOff val="0"/>
+            <a:alphaOff val="0"/>
+          </a:schemeClr>
+        </a:solidFill>
+        <a:ln w="15875" cap="rnd" cmpd="sng" algn="ctr">
+          <a:solidFill>
+            <a:schemeClr val="lt1">
+              <a:hueOff val="0"/>
+              <a:satOff val="0"/>
+              <a:lumOff val="0"/>
+              <a:alphaOff val="0"/>
+            </a:schemeClr>
+          </a:solidFill>
+          <a:prstDash val="solid"/>
+        </a:ln>
+        <a:effectLst/>
+      </dsp:spPr>
+      <dsp:style>
+        <a:lnRef idx="2">
+          <a:scrgbClr r="0" g="0" b="0"/>
+        </a:lnRef>
+        <a:fillRef idx="1">
+          <a:scrgbClr r="0" g="0" b="0"/>
+        </a:fillRef>
+        <a:effectRef idx="0">
+          <a:scrgbClr r="0" g="0" b="0"/>
+        </a:effectRef>
+        <a:fontRef idx="minor">
+          <a:schemeClr val="lt1"/>
+        </a:fontRef>
+      </dsp:style>
+      <dsp:txBody>
+        <a:bodyPr spcFirstLastPara="0" vert="horz" wrap="square" lIns="12700" tIns="12700" rIns="12700" bIns="12700" numCol="1" spcCol="1270" anchor="ctr" anchorCtr="0">
+          <a:noAutofit/>
+        </a:bodyPr>
+        <a:lstStyle/>
+        <a:p>
+          <a:pPr lvl="0" algn="ctr" defTabSz="889000">
+            <a:lnSpc>
+              <a:spcPct val="90000"/>
+            </a:lnSpc>
+            <a:spcBef>
+              <a:spcPct val="0"/>
+            </a:spcBef>
+            <a:spcAft>
+              <a:spcPct val="35000"/>
+            </a:spcAft>
+          </a:pPr>
+          <a:r>
+            <a:rPr lang="fr-FR" sz="2000" kern="1200" dirty="0" smtClean="0"/>
+            <a:t>last_jo_top5_team</a:t>
+          </a:r>
+          <a:endParaRPr lang="fr-FR" sz="2000" kern="1200" dirty="0"/>
+        </a:p>
+      </dsp:txBody>
+      <dsp:txXfrm>
+        <a:off x="561696" y="532314"/>
+        <a:ext cx="2811975" cy="337766"/>
+      </dsp:txXfrm>
+    </dsp:sp>
+    <dsp:sp modelId="{B9BDC115-4FB9-48C1-8E57-C838BE0A2ABA}">
+      <dsp:nvSpPr>
+        <dsp:cNvPr id="0" name=""/>
+        <dsp:cNvSpPr/>
+      </dsp:nvSpPr>
+      <dsp:spPr>
+        <a:xfrm>
+          <a:off x="561696" y="954522"/>
+          <a:ext cx="2790792" cy="337766"/>
+        </a:xfrm>
+        <a:prstGeom prst="rect">
+          <a:avLst/>
+        </a:prstGeom>
+        <a:solidFill>
+          <a:schemeClr val="accent1">
+            <a:hueOff val="0"/>
+            <a:satOff val="0"/>
+            <a:lumOff val="0"/>
+            <a:alphaOff val="0"/>
+          </a:schemeClr>
+        </a:solidFill>
+        <a:ln w="15875" cap="rnd" cmpd="sng" algn="ctr">
+          <a:solidFill>
+            <a:schemeClr val="lt1">
+              <a:hueOff val="0"/>
+              <a:satOff val="0"/>
+              <a:lumOff val="0"/>
+              <a:alphaOff val="0"/>
+            </a:schemeClr>
+          </a:solidFill>
+          <a:prstDash val="solid"/>
+        </a:ln>
+        <a:effectLst/>
+      </dsp:spPr>
+      <dsp:style>
+        <a:lnRef idx="2">
+          <a:scrgbClr r="0" g="0" b="0"/>
+        </a:lnRef>
+        <a:fillRef idx="1">
+          <a:scrgbClr r="0" g="0" b="0"/>
+        </a:fillRef>
+        <a:effectRef idx="0">
+          <a:scrgbClr r="0" g="0" b="0"/>
+        </a:effectRef>
+        <a:fontRef idx="minor">
+          <a:schemeClr val="lt1"/>
+        </a:fontRef>
+      </dsp:style>
+      <dsp:txBody>
+        <a:bodyPr spcFirstLastPara="0" vert="horz" wrap="square" lIns="13335" tIns="13335" rIns="13335" bIns="13335" numCol="1" spcCol="1270" anchor="ctr" anchorCtr="0">
+          <a:noAutofit/>
+        </a:bodyPr>
+        <a:lstStyle/>
+        <a:p>
+          <a:pPr lvl="0" algn="ctr" defTabSz="933450">
+            <a:lnSpc>
+              <a:spcPct val="90000"/>
+            </a:lnSpc>
+            <a:spcBef>
+              <a:spcPct val="0"/>
+            </a:spcBef>
+            <a:spcAft>
+              <a:spcPct val="35000"/>
+            </a:spcAft>
+          </a:pPr>
+          <a:r>
+            <a:rPr lang="fr-FR" sz="2100" kern="1200" dirty="0" smtClean="0"/>
+            <a:t>last_jo_top5_f</a:t>
+          </a:r>
+          <a:endParaRPr lang="fr-FR" sz="2100" kern="1200" dirty="0"/>
+        </a:p>
+      </dsp:txBody>
+      <dsp:txXfrm>
+        <a:off x="561696" y="954522"/>
+        <a:ext cx="2790792" cy="337766"/>
+      </dsp:txXfrm>
+    </dsp:sp>
+    <dsp:sp modelId="{7FBF59F0-4477-4182-93DF-C298D4537512}">
+      <dsp:nvSpPr>
+        <dsp:cNvPr id="0" name=""/>
+        <dsp:cNvSpPr/>
+      </dsp:nvSpPr>
+      <dsp:spPr>
+        <a:xfrm>
+          <a:off x="561696" y="1376731"/>
+          <a:ext cx="1107874" cy="337766"/>
+        </a:xfrm>
+        <a:prstGeom prst="rect">
+          <a:avLst/>
+        </a:prstGeom>
+        <a:solidFill>
+          <a:schemeClr val="accent1">
+            <a:hueOff val="0"/>
+            <a:satOff val="0"/>
+            <a:lumOff val="0"/>
+            <a:alphaOff val="0"/>
+          </a:schemeClr>
+        </a:solidFill>
+        <a:ln w="15875" cap="rnd" cmpd="sng" algn="ctr">
+          <a:solidFill>
+            <a:schemeClr val="lt1">
+              <a:hueOff val="0"/>
+              <a:satOff val="0"/>
+              <a:lumOff val="0"/>
+              <a:alphaOff val="0"/>
+            </a:schemeClr>
+          </a:solidFill>
+          <a:prstDash val="solid"/>
+        </a:ln>
+        <a:effectLst/>
+      </dsp:spPr>
+      <dsp:style>
+        <a:lnRef idx="2">
+          <a:scrgbClr r="0" g="0" b="0"/>
+        </a:lnRef>
+        <a:fillRef idx="1">
+          <a:scrgbClr r="0" g="0" b="0"/>
+        </a:fillRef>
+        <a:effectRef idx="0">
+          <a:scrgbClr r="0" g="0" b="0"/>
+        </a:effectRef>
+        <a:fontRef idx="minor">
+          <a:schemeClr val="lt1"/>
+        </a:fontRef>
+      </dsp:style>
+      <dsp:txBody>
+        <a:bodyPr spcFirstLastPara="0" vert="horz" wrap="square" lIns="13335" tIns="13335" rIns="13335" bIns="13335" numCol="1" spcCol="1270" anchor="ctr" anchorCtr="0">
+          <a:noAutofit/>
+        </a:bodyPr>
+        <a:lstStyle/>
+        <a:p>
+          <a:pPr lvl="0" algn="ctr" defTabSz="933450">
+            <a:lnSpc>
+              <a:spcPct val="90000"/>
+            </a:lnSpc>
+            <a:spcBef>
+              <a:spcPct val="0"/>
+            </a:spcBef>
+            <a:spcAft>
+              <a:spcPct val="35000"/>
+            </a:spcAft>
+          </a:pPr>
+          <a:r>
+            <a:rPr lang="fr-FR" sz="2100" kern="1200" dirty="0" smtClean="0"/>
+            <a:t>……</a:t>
+          </a:r>
+          <a:endParaRPr lang="fr-FR" sz="2100" kern="1200" dirty="0"/>
+        </a:p>
+      </dsp:txBody>
+      <dsp:txXfrm>
+        <a:off x="561696" y="1376731"/>
+        <a:ext cx="1107874" cy="337766"/>
+      </dsp:txXfrm>
+    </dsp:sp>
   </dsp:spTree>
 </dsp:drawing>
 </file>
@@ -4496,6 +6018,380 @@
       <dsp:cNvGrpSpPr/>
     </dsp:nvGrpSpPr>
     <dsp:grpSpPr/>
+    <dsp:sp modelId="{2121BF86-87A7-4219-A149-7B3F16D9D61E}">
+      <dsp:nvSpPr>
+        <dsp:cNvPr id="0" name=""/>
+        <dsp:cNvSpPr/>
+      </dsp:nvSpPr>
+      <dsp:spPr>
+        <a:xfrm>
+          <a:off x="7804" y="1676391"/>
+          <a:ext cx="2332798" cy="1399678"/>
+        </a:xfrm>
+        <a:prstGeom prst="roundRect">
+          <a:avLst>
+            <a:gd name="adj" fmla="val 10000"/>
+          </a:avLst>
+        </a:prstGeom>
+        <a:solidFill>
+          <a:schemeClr val="accent1">
+            <a:hueOff val="0"/>
+            <a:satOff val="0"/>
+            <a:lumOff val="0"/>
+            <a:alphaOff val="0"/>
+          </a:schemeClr>
+        </a:solidFill>
+        <a:ln w="15875" cap="rnd" cmpd="sng" algn="ctr">
+          <a:solidFill>
+            <a:schemeClr val="lt1">
+              <a:hueOff val="0"/>
+              <a:satOff val="0"/>
+              <a:lumOff val="0"/>
+              <a:alphaOff val="0"/>
+            </a:schemeClr>
+          </a:solidFill>
+          <a:prstDash val="solid"/>
+        </a:ln>
+        <a:effectLst/>
+      </dsp:spPr>
+      <dsp:style>
+        <a:lnRef idx="2">
+          <a:scrgbClr r="0" g="0" b="0"/>
+        </a:lnRef>
+        <a:fillRef idx="1">
+          <a:scrgbClr r="0" g="0" b="0"/>
+        </a:fillRef>
+        <a:effectRef idx="0">
+          <a:scrgbClr r="0" g="0" b="0"/>
+        </a:effectRef>
+        <a:fontRef idx="minor">
+          <a:schemeClr val="lt1"/>
+        </a:fontRef>
+      </dsp:style>
+      <dsp:txBody>
+        <a:bodyPr spcFirstLastPara="0" vert="horz" wrap="square" lIns="137160" tIns="137160" rIns="137160" bIns="137160" numCol="1" spcCol="1270" anchor="ctr" anchorCtr="0">
+          <a:noAutofit/>
+        </a:bodyPr>
+        <a:lstStyle/>
+        <a:p>
+          <a:pPr lvl="0" algn="ctr" defTabSz="1600200">
+            <a:lnSpc>
+              <a:spcPct val="90000"/>
+            </a:lnSpc>
+            <a:spcBef>
+              <a:spcPct val="0"/>
+            </a:spcBef>
+            <a:spcAft>
+              <a:spcPct val="35000"/>
+            </a:spcAft>
+          </a:pPr>
+          <a:r>
+            <a:rPr lang="fr-FR" sz="3600" kern="1200" dirty="0" smtClean="0"/>
+            <a:t>JSON File</a:t>
+          </a:r>
+          <a:endParaRPr lang="fr-FR" sz="3600" kern="1200" dirty="0"/>
+        </a:p>
+      </dsp:txBody>
+      <dsp:txXfrm>
+        <a:off x="48799" y="1717386"/>
+        <a:ext cx="2250808" cy="1317688"/>
+      </dsp:txXfrm>
+    </dsp:sp>
+    <dsp:sp modelId="{847B923A-5DFF-4621-8393-5FF2B25523D3}">
+      <dsp:nvSpPr>
+        <dsp:cNvPr id="0" name=""/>
+        <dsp:cNvSpPr/>
+      </dsp:nvSpPr>
+      <dsp:spPr>
+        <a:xfrm>
+          <a:off x="2573882" y="2086963"/>
+          <a:ext cx="494553" cy="578533"/>
+        </a:xfrm>
+        <a:prstGeom prst="rightArrow">
+          <a:avLst>
+            <a:gd name="adj1" fmla="val 60000"/>
+            <a:gd name="adj2" fmla="val 50000"/>
+          </a:avLst>
+        </a:prstGeom>
+        <a:solidFill>
+          <a:schemeClr val="accent1">
+            <a:tint val="60000"/>
+            <a:hueOff val="0"/>
+            <a:satOff val="0"/>
+            <a:lumOff val="0"/>
+            <a:alphaOff val="0"/>
+          </a:schemeClr>
+        </a:solidFill>
+        <a:ln>
+          <a:noFill/>
+        </a:ln>
+        <a:effectLst/>
+      </dsp:spPr>
+      <dsp:style>
+        <a:lnRef idx="0">
+          <a:scrgbClr r="0" g="0" b="0"/>
+        </a:lnRef>
+        <a:fillRef idx="1">
+          <a:scrgbClr r="0" g="0" b="0"/>
+        </a:fillRef>
+        <a:effectRef idx="0">
+          <a:scrgbClr r="0" g="0" b="0"/>
+        </a:effectRef>
+        <a:fontRef idx="minor">
+          <a:schemeClr val="lt1"/>
+        </a:fontRef>
+      </dsp:style>
+      <dsp:txBody>
+        <a:bodyPr spcFirstLastPara="0" vert="horz" wrap="square" lIns="0" tIns="0" rIns="0" bIns="0" numCol="1" spcCol="1270" anchor="ctr" anchorCtr="0">
+          <a:noAutofit/>
+        </a:bodyPr>
+        <a:lstStyle/>
+        <a:p>
+          <a:pPr lvl="0" algn="ctr" defTabSz="1066800">
+            <a:lnSpc>
+              <a:spcPct val="90000"/>
+            </a:lnSpc>
+            <a:spcBef>
+              <a:spcPct val="0"/>
+            </a:spcBef>
+            <a:spcAft>
+              <a:spcPct val="35000"/>
+            </a:spcAft>
+          </a:pPr>
+          <a:endParaRPr lang="fr-FR" sz="2400" kern="1200"/>
+        </a:p>
+      </dsp:txBody>
+      <dsp:txXfrm>
+        <a:off x="2573882" y="2202670"/>
+        <a:ext cx="346187" cy="347119"/>
+      </dsp:txXfrm>
+    </dsp:sp>
+    <dsp:sp modelId="{9A8CC479-1AB3-426B-810D-FB2E47D70E44}">
+      <dsp:nvSpPr>
+        <dsp:cNvPr id="0" name=""/>
+        <dsp:cNvSpPr/>
+      </dsp:nvSpPr>
+      <dsp:spPr>
+        <a:xfrm>
+          <a:off x="3273722" y="1676391"/>
+          <a:ext cx="2332798" cy="1399678"/>
+        </a:xfrm>
+        <a:prstGeom prst="roundRect">
+          <a:avLst>
+            <a:gd name="adj" fmla="val 10000"/>
+          </a:avLst>
+        </a:prstGeom>
+        <a:solidFill>
+          <a:schemeClr val="accent1">
+            <a:hueOff val="0"/>
+            <a:satOff val="0"/>
+            <a:lumOff val="0"/>
+            <a:alphaOff val="0"/>
+          </a:schemeClr>
+        </a:solidFill>
+        <a:ln w="15875" cap="rnd" cmpd="sng" algn="ctr">
+          <a:solidFill>
+            <a:schemeClr val="lt1">
+              <a:hueOff val="0"/>
+              <a:satOff val="0"/>
+              <a:lumOff val="0"/>
+              <a:alphaOff val="0"/>
+            </a:schemeClr>
+          </a:solidFill>
+          <a:prstDash val="solid"/>
+        </a:ln>
+        <a:effectLst/>
+      </dsp:spPr>
+      <dsp:style>
+        <a:lnRef idx="2">
+          <a:scrgbClr r="0" g="0" b="0"/>
+        </a:lnRef>
+        <a:fillRef idx="1">
+          <a:scrgbClr r="0" g="0" b="0"/>
+        </a:fillRef>
+        <a:effectRef idx="0">
+          <a:scrgbClr r="0" g="0" b="0"/>
+        </a:effectRef>
+        <a:fontRef idx="minor">
+          <a:schemeClr val="lt1"/>
+        </a:fontRef>
+      </dsp:style>
+      <dsp:txBody>
+        <a:bodyPr spcFirstLastPara="0" vert="horz" wrap="square" lIns="137160" tIns="137160" rIns="137160" bIns="137160" numCol="1" spcCol="1270" anchor="ctr" anchorCtr="0">
+          <a:noAutofit/>
+        </a:bodyPr>
+        <a:lstStyle/>
+        <a:p>
+          <a:pPr lvl="0" algn="ctr" defTabSz="1600200">
+            <a:lnSpc>
+              <a:spcPct val="90000"/>
+            </a:lnSpc>
+            <a:spcBef>
+              <a:spcPct val="0"/>
+            </a:spcBef>
+            <a:spcAft>
+              <a:spcPct val="35000"/>
+            </a:spcAft>
+          </a:pPr>
+          <a:r>
+            <a:rPr lang="fr-FR" sz="3600" kern="1200" dirty="0" smtClean="0"/>
+            <a:t>CSV</a:t>
+          </a:r>
+          <a:endParaRPr lang="fr-FR" sz="3600" kern="1200" dirty="0"/>
+        </a:p>
+      </dsp:txBody>
+      <dsp:txXfrm>
+        <a:off x="3314717" y="1717386"/>
+        <a:ext cx="2250808" cy="1317688"/>
+      </dsp:txXfrm>
+    </dsp:sp>
+    <dsp:sp modelId="{1E204E24-A162-419C-8605-7E302B12AB5A}">
+      <dsp:nvSpPr>
+        <dsp:cNvPr id="0" name=""/>
+        <dsp:cNvSpPr/>
+      </dsp:nvSpPr>
+      <dsp:spPr>
+        <a:xfrm>
+          <a:off x="5839800" y="2086963"/>
+          <a:ext cx="494553" cy="578533"/>
+        </a:xfrm>
+        <a:prstGeom prst="rightArrow">
+          <a:avLst>
+            <a:gd name="adj1" fmla="val 60000"/>
+            <a:gd name="adj2" fmla="val 50000"/>
+          </a:avLst>
+        </a:prstGeom>
+        <a:solidFill>
+          <a:schemeClr val="accent1">
+            <a:tint val="60000"/>
+            <a:hueOff val="0"/>
+            <a:satOff val="0"/>
+            <a:lumOff val="0"/>
+            <a:alphaOff val="0"/>
+          </a:schemeClr>
+        </a:solidFill>
+        <a:ln>
+          <a:noFill/>
+        </a:ln>
+        <a:effectLst/>
+      </dsp:spPr>
+      <dsp:style>
+        <a:lnRef idx="0">
+          <a:scrgbClr r="0" g="0" b="0"/>
+        </a:lnRef>
+        <a:fillRef idx="1">
+          <a:scrgbClr r="0" g="0" b="0"/>
+        </a:fillRef>
+        <a:effectRef idx="0">
+          <a:scrgbClr r="0" g="0" b="0"/>
+        </a:effectRef>
+        <a:fontRef idx="minor">
+          <a:schemeClr val="lt1"/>
+        </a:fontRef>
+      </dsp:style>
+      <dsp:txBody>
+        <a:bodyPr spcFirstLastPara="0" vert="horz" wrap="square" lIns="0" tIns="0" rIns="0" bIns="0" numCol="1" spcCol="1270" anchor="ctr" anchorCtr="0">
+          <a:noAutofit/>
+        </a:bodyPr>
+        <a:lstStyle/>
+        <a:p>
+          <a:pPr lvl="0" algn="ctr" defTabSz="1066800">
+            <a:lnSpc>
+              <a:spcPct val="90000"/>
+            </a:lnSpc>
+            <a:spcBef>
+              <a:spcPct val="0"/>
+            </a:spcBef>
+            <a:spcAft>
+              <a:spcPct val="35000"/>
+            </a:spcAft>
+          </a:pPr>
+          <a:endParaRPr lang="fr-FR" sz="2400" kern="1200"/>
+        </a:p>
+      </dsp:txBody>
+      <dsp:txXfrm>
+        <a:off x="5839800" y="2202670"/>
+        <a:ext cx="346187" cy="347119"/>
+      </dsp:txXfrm>
+    </dsp:sp>
+    <dsp:sp modelId="{2111CCA4-5186-4461-B24A-1BDD216CC184}">
+      <dsp:nvSpPr>
+        <dsp:cNvPr id="0" name=""/>
+        <dsp:cNvSpPr/>
+      </dsp:nvSpPr>
+      <dsp:spPr>
+        <a:xfrm>
+          <a:off x="6539639" y="1676391"/>
+          <a:ext cx="2332798" cy="1399678"/>
+        </a:xfrm>
+        <a:prstGeom prst="roundRect">
+          <a:avLst>
+            <a:gd name="adj" fmla="val 10000"/>
+          </a:avLst>
+        </a:prstGeom>
+        <a:solidFill>
+          <a:schemeClr val="accent1">
+            <a:hueOff val="0"/>
+            <a:satOff val="0"/>
+            <a:lumOff val="0"/>
+            <a:alphaOff val="0"/>
+          </a:schemeClr>
+        </a:solidFill>
+        <a:ln w="15875" cap="rnd" cmpd="sng" algn="ctr">
+          <a:solidFill>
+            <a:schemeClr val="lt1">
+              <a:hueOff val="0"/>
+              <a:satOff val="0"/>
+              <a:lumOff val="0"/>
+              <a:alphaOff val="0"/>
+            </a:schemeClr>
+          </a:solidFill>
+          <a:prstDash val="solid"/>
+        </a:ln>
+        <a:effectLst/>
+      </dsp:spPr>
+      <dsp:style>
+        <a:lnRef idx="2">
+          <a:scrgbClr r="0" g="0" b="0"/>
+        </a:lnRef>
+        <a:fillRef idx="1">
+          <a:scrgbClr r="0" g="0" b="0"/>
+        </a:fillRef>
+        <a:effectRef idx="0">
+          <a:scrgbClr r="0" g="0" b="0"/>
+        </a:effectRef>
+        <a:fontRef idx="minor">
+          <a:schemeClr val="lt1"/>
+        </a:fontRef>
+      </dsp:style>
+      <dsp:txBody>
+        <a:bodyPr spcFirstLastPara="0" vert="horz" wrap="square" lIns="137160" tIns="137160" rIns="137160" bIns="137160" numCol="1" spcCol="1270" anchor="ctr" anchorCtr="0">
+          <a:noAutofit/>
+        </a:bodyPr>
+        <a:lstStyle/>
+        <a:p>
+          <a:pPr lvl="0" algn="ctr" defTabSz="1600200">
+            <a:lnSpc>
+              <a:spcPct val="90000"/>
+            </a:lnSpc>
+            <a:spcBef>
+              <a:spcPct val="0"/>
+            </a:spcBef>
+            <a:spcAft>
+              <a:spcPct val="35000"/>
+            </a:spcAft>
+          </a:pPr>
+          <a:r>
+            <a:rPr lang="fr-FR" sz="3600" kern="1200" dirty="0" smtClean="0"/>
+            <a:t>Lake</a:t>
+          </a:r>
+        </a:p>
+      </dsp:txBody>
+      <dsp:txXfrm>
+        <a:off x="6580634" y="1717386"/>
+        <a:ext cx="2250808" cy="1317688"/>
+      </dsp:txXfrm>
+    </dsp:sp>
   </dsp:spTree>
 </dsp:drawing>
 </file>
@@ -10219,6 +12115,352 @@
           <a:bodyPr/>
           <a:lstStyle/>
           <a:p>
+            <a:pPr marL="0" marR="0" lvl="0" indent="0" algn="l" defTabSz="914400" rtl="0" eaLnBrk="1" fontAlgn="auto" latinLnBrk="0" hangingPunct="1">
+              <a:lnSpc>
+                <a:spcPct val="100000"/>
+              </a:lnSpc>
+              <a:spcBef>
+                <a:spcPts val="0"/>
+              </a:spcBef>
+              <a:spcAft>
+                <a:spcPts val="0"/>
+              </a:spcAft>
+              <a:buClrTx/>
+              <a:buSzTx/>
+              <a:buFontTx/>
+              <a:buNone/>
+              <a:tabLst/>
+              <a:defRPr/>
+            </a:pPr>
+            <a:r>
+              <a:rPr lang="fr-FR" sz="1200" spc="-1" dirty="0" err="1" smtClean="0">
+                <a:solidFill>
+                  <a:schemeClr val="accent2"/>
+                </a:solidFill>
+                <a:latin typeface="+mn-lt"/>
+              </a:rPr>
+              <a:t>Transformed</a:t>
+            </a:r>
+            <a:r>
+              <a:rPr lang="fr-FR" sz="1200" spc="-1" dirty="0" smtClean="0">
+                <a:solidFill>
+                  <a:schemeClr val="accent2"/>
+                </a:solidFill>
+                <a:latin typeface="+mn-lt"/>
+              </a:rPr>
+              <a:t> files are </a:t>
+            </a:r>
+            <a:r>
+              <a:rPr lang="fr-FR" sz="1200" spc="-1" dirty="0" err="1" smtClean="0">
+                <a:solidFill>
+                  <a:schemeClr val="accent2"/>
+                </a:solidFill>
+                <a:latin typeface="+mn-lt"/>
+              </a:rPr>
+              <a:t>stored</a:t>
+            </a:r>
+            <a:r>
+              <a:rPr lang="fr-FR" sz="1200" spc="-1" dirty="0" smtClean="0">
+                <a:solidFill>
+                  <a:schemeClr val="accent2"/>
+                </a:solidFill>
+                <a:latin typeface="+mn-lt"/>
+              </a:rPr>
+              <a:t> </a:t>
+            </a:r>
+            <a:r>
+              <a:rPr lang="fr-FR" sz="1200" spc="-1" dirty="0" err="1" smtClean="0">
+                <a:solidFill>
+                  <a:schemeClr val="accent2"/>
+                </a:solidFill>
+                <a:latin typeface="+mn-lt"/>
+              </a:rPr>
+              <a:t>into</a:t>
+            </a:r>
+            <a:r>
+              <a:rPr lang="fr-FR" sz="1200" spc="-1" dirty="0" smtClean="0">
+                <a:solidFill>
+                  <a:schemeClr val="accent2"/>
+                </a:solidFill>
+                <a:latin typeface="+mn-lt"/>
+              </a:rPr>
+              <a:t> a </a:t>
+            </a:r>
+            <a:r>
+              <a:rPr lang="fr-FR" sz="1200" spc="-1" dirty="0" err="1" smtClean="0">
+                <a:solidFill>
+                  <a:schemeClr val="accent2"/>
+                </a:solidFill>
+                <a:latin typeface="+mn-lt"/>
+              </a:rPr>
+              <a:t>specific</a:t>
+            </a:r>
+            <a:r>
+              <a:rPr lang="fr-FR" sz="1200" spc="-1" dirty="0" smtClean="0">
+                <a:solidFill>
+                  <a:schemeClr val="accent2"/>
+                </a:solidFill>
+                <a:latin typeface="+mn-lt"/>
+              </a:rPr>
+              <a:t> </a:t>
+            </a:r>
+            <a:r>
+              <a:rPr lang="fr-FR" sz="1200" spc="-1" dirty="0" err="1" smtClean="0">
+                <a:solidFill>
+                  <a:schemeClr val="accent2"/>
+                </a:solidFill>
+                <a:latin typeface="+mn-lt"/>
+              </a:rPr>
+              <a:t>folder</a:t>
+            </a:r>
+            <a:r>
+              <a:rPr lang="fr-FR" sz="1200" spc="-1" dirty="0" smtClean="0">
+                <a:solidFill>
+                  <a:schemeClr val="accent2"/>
+                </a:solidFill>
+                <a:latin typeface="+mn-lt"/>
+              </a:rPr>
+              <a:t> on the cluster. This </a:t>
+            </a:r>
+            <a:r>
+              <a:rPr lang="fr-FR" sz="1200" spc="-1" dirty="0" err="1" smtClean="0">
+                <a:solidFill>
+                  <a:schemeClr val="accent2"/>
+                </a:solidFill>
+                <a:latin typeface="+mn-lt"/>
+              </a:rPr>
+              <a:t>folder</a:t>
+            </a:r>
+            <a:r>
+              <a:rPr lang="fr-FR" sz="1200" spc="-1" dirty="0" smtClean="0">
+                <a:solidFill>
+                  <a:schemeClr val="accent2"/>
+                </a:solidFill>
+                <a:latin typeface="+mn-lt"/>
+              </a:rPr>
+              <a:t> </a:t>
+            </a:r>
+            <a:r>
+              <a:rPr lang="fr-FR" sz="1200" spc="-1" dirty="0" err="1" smtClean="0">
+                <a:solidFill>
+                  <a:schemeClr val="accent2"/>
+                </a:solidFill>
+                <a:latin typeface="+mn-lt"/>
+              </a:rPr>
+              <a:t>is</a:t>
+            </a:r>
+            <a:r>
+              <a:rPr lang="fr-FR" sz="1200" spc="-1" dirty="0" smtClean="0">
+                <a:solidFill>
+                  <a:schemeClr val="accent2"/>
+                </a:solidFill>
+                <a:latin typeface="+mn-lt"/>
+              </a:rPr>
+              <a:t> « </a:t>
+            </a:r>
+            <a:r>
+              <a:rPr lang="fr-FR" sz="1200" spc="-1" dirty="0" err="1" smtClean="0">
+                <a:solidFill>
+                  <a:schemeClr val="accent2"/>
+                </a:solidFill>
+                <a:latin typeface="+mn-lt"/>
+              </a:rPr>
+              <a:t>lake</a:t>
+            </a:r>
+            <a:r>
+              <a:rPr lang="fr-FR" sz="1200" spc="-1" dirty="0" smtClean="0">
+                <a:solidFill>
+                  <a:schemeClr val="accent2"/>
+                </a:solidFill>
+                <a:latin typeface="+mn-lt"/>
+              </a:rPr>
+              <a:t> ».</a:t>
+            </a:r>
+          </a:p>
+          <a:p>
+            <a:pPr marL="0" marR="0" lvl="0" indent="0" algn="l" defTabSz="914400" rtl="0" eaLnBrk="1" fontAlgn="auto" latinLnBrk="0" hangingPunct="1">
+              <a:lnSpc>
+                <a:spcPct val="100000"/>
+              </a:lnSpc>
+              <a:spcBef>
+                <a:spcPts val="0"/>
+              </a:spcBef>
+              <a:spcAft>
+                <a:spcPts val="0"/>
+              </a:spcAft>
+              <a:buClrTx/>
+              <a:buSzTx/>
+              <a:buFontTx/>
+              <a:buNone/>
+              <a:tabLst/>
+              <a:defRPr/>
+            </a:pPr>
+            <a:endParaRPr lang="fr-FR" sz="1200" spc="-1" dirty="0" smtClean="0">
+              <a:solidFill>
+                <a:schemeClr val="accent2"/>
+              </a:solidFill>
+              <a:latin typeface="+mn-lt"/>
+            </a:endParaRPr>
+          </a:p>
+          <a:p>
+            <a:pPr marL="0" marR="0" lvl="0" indent="0" algn="l" defTabSz="914400" rtl="0" eaLnBrk="1" fontAlgn="auto" latinLnBrk="0" hangingPunct="1">
+              <a:lnSpc>
+                <a:spcPct val="100000"/>
+              </a:lnSpc>
+              <a:spcBef>
+                <a:spcPts val="0"/>
+              </a:spcBef>
+              <a:spcAft>
+                <a:spcPts val="0"/>
+              </a:spcAft>
+              <a:buClrTx/>
+              <a:buSzTx/>
+              <a:buFontTx/>
+              <a:buNone/>
+              <a:tabLst/>
+              <a:defRPr/>
+            </a:pPr>
+            <a:r>
+              <a:rPr lang="fr-FR" sz="1200" spc="-1" dirty="0" smtClean="0">
+                <a:solidFill>
+                  <a:schemeClr val="accent2"/>
+                </a:solidFill>
+                <a:latin typeface="+mn-lt"/>
+              </a:rPr>
+              <a:t>The parquet files </a:t>
+            </a:r>
+            <a:r>
+              <a:rPr lang="fr-FR" sz="1200" spc="-1" dirty="0" err="1" smtClean="0">
+                <a:solidFill>
+                  <a:schemeClr val="accent2"/>
+                </a:solidFill>
+                <a:latin typeface="+mn-lt"/>
+              </a:rPr>
+              <a:t>will</a:t>
+            </a:r>
+            <a:r>
+              <a:rPr lang="fr-FR" sz="1200" spc="-1" dirty="0" smtClean="0">
+                <a:solidFill>
+                  <a:schemeClr val="accent2"/>
+                </a:solidFill>
+                <a:latin typeface="+mn-lt"/>
+              </a:rPr>
+              <a:t> </a:t>
+            </a:r>
+            <a:r>
+              <a:rPr lang="fr-FR" sz="1200" spc="-1" dirty="0" err="1" smtClean="0">
+                <a:solidFill>
+                  <a:schemeClr val="accent2"/>
+                </a:solidFill>
+                <a:latin typeface="+mn-lt"/>
+              </a:rPr>
+              <a:t>be</a:t>
+            </a:r>
+            <a:r>
+              <a:rPr lang="fr-FR" sz="1200" spc="-1" dirty="0" smtClean="0">
+                <a:solidFill>
+                  <a:schemeClr val="accent2"/>
+                </a:solidFill>
+                <a:latin typeface="+mn-lt"/>
+              </a:rPr>
+              <a:t> </a:t>
+            </a:r>
+            <a:r>
+              <a:rPr lang="fr-FR" sz="1200" spc="-1" dirty="0" err="1" smtClean="0">
+                <a:solidFill>
+                  <a:schemeClr val="accent2"/>
+                </a:solidFill>
+                <a:latin typeface="+mn-lt"/>
+              </a:rPr>
+              <a:t>regenerated</a:t>
+            </a:r>
+            <a:r>
+              <a:rPr lang="fr-FR" sz="1200" spc="-1" dirty="0" smtClean="0">
+                <a:solidFill>
+                  <a:schemeClr val="accent2"/>
+                </a:solidFill>
+                <a:latin typeface="+mn-lt"/>
+              </a:rPr>
+              <a:t> </a:t>
+            </a:r>
+            <a:r>
+              <a:rPr lang="fr-FR" sz="1200" spc="-1" dirty="0" err="1" smtClean="0">
+                <a:solidFill>
+                  <a:schemeClr val="accent2"/>
+                </a:solidFill>
+                <a:latin typeface="+mn-lt"/>
+              </a:rPr>
+              <a:t>each</a:t>
+            </a:r>
+            <a:r>
+              <a:rPr lang="fr-FR" sz="1200" spc="-1" dirty="0" smtClean="0">
+                <a:solidFill>
+                  <a:schemeClr val="accent2"/>
+                </a:solidFill>
+                <a:latin typeface="+mn-lt"/>
+              </a:rPr>
+              <a:t> time the workflow </a:t>
+            </a:r>
+            <a:r>
+              <a:rPr lang="fr-FR" sz="1200" spc="-1" dirty="0" err="1" smtClean="0">
+                <a:solidFill>
+                  <a:schemeClr val="accent2"/>
+                </a:solidFill>
+                <a:latin typeface="+mn-lt"/>
+              </a:rPr>
+              <a:t>will</a:t>
+            </a:r>
+            <a:r>
+              <a:rPr lang="fr-FR" sz="1200" spc="-1" dirty="0" smtClean="0">
+                <a:solidFill>
+                  <a:schemeClr val="accent2"/>
+                </a:solidFill>
+                <a:latin typeface="+mn-lt"/>
+              </a:rPr>
+              <a:t> </a:t>
+            </a:r>
+            <a:r>
+              <a:rPr lang="fr-FR" sz="1200" spc="-1" dirty="0" err="1" smtClean="0">
+                <a:solidFill>
+                  <a:schemeClr val="accent2"/>
+                </a:solidFill>
+                <a:latin typeface="+mn-lt"/>
+              </a:rPr>
+              <a:t>run</a:t>
+            </a:r>
+            <a:endParaRPr lang="fr-FR" sz="1600" b="0" strike="noStrike" spc="-1" dirty="0" smtClean="0">
+              <a:solidFill>
+                <a:srgbClr val="000000"/>
+              </a:solidFill>
+              <a:latin typeface="+mn-lt"/>
+            </a:endParaRPr>
+          </a:p>
+          <a:p>
+            <a:pPr marL="0" marR="0" lvl="0" indent="0" algn="l" defTabSz="914400" rtl="0" eaLnBrk="1" fontAlgn="auto" latinLnBrk="0" hangingPunct="1">
+              <a:lnSpc>
+                <a:spcPct val="100000"/>
+              </a:lnSpc>
+              <a:spcBef>
+                <a:spcPts val="0"/>
+              </a:spcBef>
+              <a:spcAft>
+                <a:spcPts val="0"/>
+              </a:spcAft>
+              <a:buClrTx/>
+              <a:buSzTx/>
+              <a:buFontTx/>
+              <a:buNone/>
+              <a:tabLst/>
+              <a:defRPr/>
+            </a:pPr>
+            <a:endParaRPr lang="fr-FR" sz="1200" spc="-1" dirty="0" smtClean="0">
+              <a:solidFill>
+                <a:schemeClr val="accent2"/>
+              </a:solidFill>
+              <a:latin typeface="+mn-lt"/>
+            </a:endParaRPr>
+          </a:p>
+          <a:p>
             <a:endParaRPr lang="fr-FR" dirty="0"/>
           </a:p>
         </p:txBody>
@@ -10240,7 +12482,7 @@
           <a:p>
             <a:fld id="{14218910-390D-4E2D-864A-4A553316EEE1}" type="slidenum">
               <a:rPr lang="fr-FR" smtClean="0"/>
-              <a:t>25</a:t>
+              <a:t>14</a:t>
             </a:fld>
             <a:endParaRPr lang="fr-FR"/>
           </a:p>
@@ -10249,7 +12491,7 @@
     </p:spTree>
     <p:extLst>
       <p:ext uri="{BB962C8B-B14F-4D97-AF65-F5344CB8AC3E}">
-        <p14:creationId xmlns:p14="http://schemas.microsoft.com/office/powerpoint/2010/main" val="3514312264"/>
+        <p14:creationId xmlns:p14="http://schemas.microsoft.com/office/powerpoint/2010/main" val="3558579104"/>
       </p:ext>
     </p:extLst>
   </p:cSld>
@@ -10260,6 +12502,675 @@
 </file>
 
 <file path=ppt/notesSlides/notesSlide11.xml><?xml version="1.0" encoding="utf-8"?>
+<p:notes xmlns:a="http://schemas.openxmlformats.org/drawingml/2006/main" xmlns:r="http://schemas.openxmlformats.org/officeDocument/2006/relationships" xmlns:p="http://schemas.openxmlformats.org/presentationml/2006/main">
+  <p:cSld>
+    <p:spTree>
+      <p:nvGrpSpPr>
+        <p:cNvPr id="1" name=""/>
+        <p:cNvGrpSpPr/>
+        <p:nvPr/>
+      </p:nvGrpSpPr>
+      <p:grpSpPr>
+        <a:xfrm>
+          <a:off x="0" y="0"/>
+          <a:ext cx="0" cy="0"/>
+          <a:chOff x="0" y="0"/>
+          <a:chExt cx="0" cy="0"/>
+        </a:xfrm>
+      </p:grpSpPr>
+      <p:sp>
+        <p:nvSpPr>
+          <p:cNvPr id="2" name="Espace réservé de l'image des diapositives 1"/>
+          <p:cNvSpPr>
+            <a:spLocks noGrp="1" noRot="1" noChangeAspect="1"/>
+          </p:cNvSpPr>
+          <p:nvPr>
+            <p:ph type="sldImg"/>
+          </p:nvPr>
+        </p:nvSpPr>
+        <p:spPr/>
+      </p:sp>
+      <p:sp>
+        <p:nvSpPr>
+          <p:cNvPr id="3" name="Espace réservé des notes 2"/>
+          <p:cNvSpPr>
+            <a:spLocks noGrp="1"/>
+          </p:cNvSpPr>
+          <p:nvPr>
+            <p:ph type="body" idx="1"/>
+          </p:nvPr>
+        </p:nvSpPr>
+        <p:spPr/>
+        <p:txBody>
+          <a:bodyPr/>
+          <a:lstStyle/>
+          <a:p>
+            <a:r>
+              <a:rPr lang="fr-FR" dirty="0" smtClean="0"/>
+              <a:t>les données sont disponibles dans le lac en format parquet : Premièrement : créer une table externe </a:t>
+            </a:r>
+            <a:r>
+              <a:rPr lang="fr-FR" dirty="0" err="1" smtClean="0"/>
+              <a:t>Hive</a:t>
+            </a:r>
+            <a:r>
+              <a:rPr lang="fr-FR" dirty="0" smtClean="0"/>
+              <a:t> pour l’ensemble du stockage de fichiers </a:t>
+            </a:r>
+            <a:r>
+              <a:rPr lang="fr-FR" dirty="0" err="1" smtClean="0"/>
+              <a:t>parket</a:t>
+            </a:r>
+            <a:r>
+              <a:rPr lang="fr-FR" dirty="0" smtClean="0"/>
+              <a:t> Deuxièmement : créer des tableaux gérés en fonction du tableau externe précédent. Cela permettra de générer de nouvelles données, c’est-à-dire des « données métriques ». 8 tableaux gérés, un pour chacune des 8 mesures demandées dans UC1. </a:t>
+            </a:r>
+            <a:endParaRPr lang="fr-FR" dirty="0"/>
+          </a:p>
+        </p:txBody>
+      </p:sp>
+      <p:sp>
+        <p:nvSpPr>
+          <p:cNvPr id="4" name="Espace réservé du numéro de diapositive 3"/>
+          <p:cNvSpPr>
+            <a:spLocks noGrp="1"/>
+          </p:cNvSpPr>
+          <p:nvPr>
+            <p:ph type="sldNum" sz="quarter" idx="10"/>
+          </p:nvPr>
+        </p:nvSpPr>
+        <p:spPr/>
+        <p:txBody>
+          <a:bodyPr/>
+          <a:lstStyle/>
+          <a:p>
+            <a:fld id="{14218910-390D-4E2D-864A-4A553316EEE1}" type="slidenum">
+              <a:rPr lang="fr-FR" smtClean="0"/>
+              <a:t>15</a:t>
+            </a:fld>
+            <a:endParaRPr lang="fr-FR"/>
+          </a:p>
+        </p:txBody>
+      </p:sp>
+    </p:spTree>
+    <p:extLst>
+      <p:ext uri="{BB962C8B-B14F-4D97-AF65-F5344CB8AC3E}">
+        <p14:creationId xmlns:p14="http://schemas.microsoft.com/office/powerpoint/2010/main" val="3156661023"/>
+      </p:ext>
+    </p:extLst>
+  </p:cSld>
+  <p:clrMapOvr>
+    <a:masterClrMapping/>
+  </p:clrMapOvr>
+</p:notes>
+</file>
+
+<file path=ppt/notesSlides/notesSlide12.xml><?xml version="1.0" encoding="utf-8"?>
+<p:notes xmlns:a="http://schemas.openxmlformats.org/drawingml/2006/main" xmlns:r="http://schemas.openxmlformats.org/officeDocument/2006/relationships" xmlns:p="http://schemas.openxmlformats.org/presentationml/2006/main">
+  <p:cSld>
+    <p:spTree>
+      <p:nvGrpSpPr>
+        <p:cNvPr id="1" name=""/>
+        <p:cNvGrpSpPr/>
+        <p:nvPr/>
+      </p:nvGrpSpPr>
+      <p:grpSpPr>
+        <a:xfrm>
+          <a:off x="0" y="0"/>
+          <a:ext cx="0" cy="0"/>
+          <a:chOff x="0" y="0"/>
+          <a:chExt cx="0" cy="0"/>
+        </a:xfrm>
+      </p:grpSpPr>
+      <p:sp>
+        <p:nvSpPr>
+          <p:cNvPr id="2" name="Espace réservé de l'image des diapositives 1"/>
+          <p:cNvSpPr>
+            <a:spLocks noGrp="1" noRot="1" noChangeAspect="1"/>
+          </p:cNvSpPr>
+          <p:nvPr>
+            <p:ph type="sldImg"/>
+          </p:nvPr>
+        </p:nvSpPr>
+        <p:spPr/>
+      </p:sp>
+      <p:sp>
+        <p:nvSpPr>
+          <p:cNvPr id="3" name="Espace réservé des notes 2"/>
+          <p:cNvSpPr>
+            <a:spLocks noGrp="1"/>
+          </p:cNvSpPr>
+          <p:nvPr>
+            <p:ph type="body" idx="1"/>
+          </p:nvPr>
+        </p:nvSpPr>
+        <p:spPr/>
+        <p:txBody>
+          <a:bodyPr/>
+          <a:lstStyle/>
+          <a:p>
+            <a:r>
+              <a:rPr lang="fr-FR" dirty="0" smtClean="0"/>
+              <a:t>A partir des données du </a:t>
+            </a:r>
+            <a:r>
+              <a:rPr lang="fr-FR" dirty="0" err="1" smtClean="0"/>
+              <a:t>datalake</a:t>
+            </a:r>
+            <a:r>
+              <a:rPr lang="fr-FR" dirty="0" smtClean="0"/>
+              <a:t> on avait besoin de </a:t>
+            </a:r>
+            <a:r>
+              <a:rPr lang="fr-FR" dirty="0" err="1" smtClean="0"/>
+              <a:t>generer</a:t>
+            </a:r>
+            <a:r>
+              <a:rPr lang="fr-FR" baseline="0" dirty="0" smtClean="0"/>
+              <a:t> des rapports, pour cela nous avons créé des tables sur </a:t>
+            </a:r>
+            <a:r>
+              <a:rPr lang="fr-FR" baseline="0" dirty="0" err="1" smtClean="0"/>
+              <a:t>hive</a:t>
+            </a:r>
+            <a:r>
+              <a:rPr lang="fr-FR" baseline="0" dirty="0" smtClean="0"/>
+              <a:t> (hue), en utilisant le connecteur </a:t>
+            </a:r>
+            <a:r>
+              <a:rPr lang="fr-FR" baseline="0" dirty="0" err="1" smtClean="0"/>
+              <a:t>Hadoop</a:t>
+            </a:r>
+            <a:r>
+              <a:rPr lang="fr-FR" baseline="0" dirty="0" smtClean="0"/>
+              <a:t> ODBC </a:t>
+            </a:r>
+            <a:r>
+              <a:rPr lang="fr-FR" baseline="0" dirty="0" err="1" smtClean="0"/>
+              <a:t>Hive</a:t>
+            </a:r>
+            <a:r>
+              <a:rPr lang="fr-FR" baseline="0" dirty="0" smtClean="0"/>
+              <a:t> de </a:t>
+            </a:r>
+            <a:r>
+              <a:rPr lang="fr-FR" baseline="0" dirty="0" err="1" smtClean="0"/>
+              <a:t>microsft</a:t>
+            </a:r>
+            <a:r>
+              <a:rPr lang="fr-FR" baseline="0" dirty="0" smtClean="0"/>
+              <a:t> on a exporté les données sur power BI via ce connecteur,</a:t>
+            </a:r>
+            <a:endParaRPr lang="fr-FR" dirty="0"/>
+          </a:p>
+        </p:txBody>
+      </p:sp>
+      <p:sp>
+        <p:nvSpPr>
+          <p:cNvPr id="4" name="Espace réservé du numéro de diapositive 3"/>
+          <p:cNvSpPr>
+            <a:spLocks noGrp="1"/>
+          </p:cNvSpPr>
+          <p:nvPr>
+            <p:ph type="sldNum" sz="quarter" idx="10"/>
+          </p:nvPr>
+        </p:nvSpPr>
+        <p:spPr/>
+        <p:txBody>
+          <a:bodyPr/>
+          <a:lstStyle/>
+          <a:p>
+            <a:fld id="{14218910-390D-4E2D-864A-4A553316EEE1}" type="slidenum">
+              <a:rPr lang="fr-FR" smtClean="0"/>
+              <a:t>17</a:t>
+            </a:fld>
+            <a:endParaRPr lang="fr-FR"/>
+          </a:p>
+        </p:txBody>
+      </p:sp>
+    </p:spTree>
+    <p:extLst>
+      <p:ext uri="{BB962C8B-B14F-4D97-AF65-F5344CB8AC3E}">
+        <p14:creationId xmlns:p14="http://schemas.microsoft.com/office/powerpoint/2010/main" val="1372384192"/>
+      </p:ext>
+    </p:extLst>
+  </p:cSld>
+  <p:clrMapOvr>
+    <a:masterClrMapping/>
+  </p:clrMapOvr>
+</p:notes>
+</file>
+
+<file path=ppt/notesSlides/notesSlide13.xml><?xml version="1.0" encoding="utf-8"?>
+<p:notes xmlns:a="http://schemas.openxmlformats.org/drawingml/2006/main" xmlns:r="http://schemas.openxmlformats.org/officeDocument/2006/relationships" xmlns:p="http://schemas.openxmlformats.org/presentationml/2006/main">
+  <p:cSld>
+    <p:spTree>
+      <p:nvGrpSpPr>
+        <p:cNvPr id="1" name=""/>
+        <p:cNvGrpSpPr/>
+        <p:nvPr/>
+      </p:nvGrpSpPr>
+      <p:grpSpPr>
+        <a:xfrm>
+          <a:off x="0" y="0"/>
+          <a:ext cx="0" cy="0"/>
+          <a:chOff x="0" y="0"/>
+          <a:chExt cx="0" cy="0"/>
+        </a:xfrm>
+      </p:grpSpPr>
+      <p:sp>
+        <p:nvSpPr>
+          <p:cNvPr id="2" name="Espace réservé de l'image des diapositives 1"/>
+          <p:cNvSpPr>
+            <a:spLocks noGrp="1" noRot="1" noChangeAspect="1"/>
+          </p:cNvSpPr>
+          <p:nvPr>
+            <p:ph type="sldImg"/>
+          </p:nvPr>
+        </p:nvSpPr>
+        <p:spPr/>
+      </p:sp>
+      <p:sp>
+        <p:nvSpPr>
+          <p:cNvPr id="3" name="Espace réservé des notes 2"/>
+          <p:cNvSpPr>
+            <a:spLocks noGrp="1"/>
+          </p:cNvSpPr>
+          <p:nvPr>
+            <p:ph type="body" idx="1"/>
+          </p:nvPr>
+        </p:nvSpPr>
+        <p:spPr/>
+        <p:txBody>
+          <a:bodyPr/>
+          <a:lstStyle/>
+          <a:p>
+            <a:r>
+              <a:rPr lang="fr-FR" dirty="0" smtClean="0"/>
+              <a:t>Nous avions plusieurs choix d’outils </a:t>
+            </a:r>
+            <a:r>
+              <a:rPr lang="fr-FR" dirty="0" err="1" smtClean="0"/>
+              <a:t>dataviz</a:t>
+            </a:r>
+            <a:r>
+              <a:rPr lang="fr-FR" dirty="0" smtClean="0"/>
+              <a:t>.</a:t>
+            </a:r>
+          </a:p>
+          <a:p>
+            <a:r>
+              <a:rPr lang="fr-FR" dirty="0" smtClean="0"/>
+              <a:t>Pour faire notre choix, nous avons utilisé une matrice simple avec 5</a:t>
+            </a:r>
+          </a:p>
+          <a:p>
+            <a:r>
+              <a:rPr lang="fr-FR" dirty="0" smtClean="0"/>
+              <a:t>points d’intérêt.</a:t>
+            </a:r>
+          </a:p>
+          <a:p>
+            <a:r>
+              <a:rPr lang="fr-FR" dirty="0" smtClean="0"/>
+              <a:t>. Coût</a:t>
+            </a:r>
+          </a:p>
+          <a:p>
+            <a:r>
+              <a:rPr lang="fr-FR" dirty="0" smtClean="0"/>
+              <a:t>. Fonction</a:t>
+            </a:r>
+          </a:p>
+          <a:p>
+            <a:r>
+              <a:rPr lang="fr-FR" dirty="0" smtClean="0"/>
+              <a:t>. installation à utiliser; . connexion </a:t>
+            </a:r>
+            <a:r>
+              <a:rPr lang="fr-FR" dirty="0" err="1" smtClean="0"/>
+              <a:t>Datalake</a:t>
+            </a:r>
+            <a:endParaRPr lang="fr-FR" dirty="0" smtClean="0"/>
+          </a:p>
+          <a:p>
+            <a:r>
+              <a:rPr lang="fr-FR" dirty="0" smtClean="0"/>
+              <a:t>. Gérer une énorme quantité de données</a:t>
+            </a:r>
+            <a:endParaRPr lang="fr-FR" dirty="0"/>
+          </a:p>
+        </p:txBody>
+      </p:sp>
+      <p:sp>
+        <p:nvSpPr>
+          <p:cNvPr id="4" name="Espace réservé du numéro de diapositive 3"/>
+          <p:cNvSpPr>
+            <a:spLocks noGrp="1"/>
+          </p:cNvSpPr>
+          <p:nvPr>
+            <p:ph type="sldNum" sz="quarter" idx="10"/>
+          </p:nvPr>
+        </p:nvSpPr>
+        <p:spPr/>
+        <p:txBody>
+          <a:bodyPr/>
+          <a:lstStyle/>
+          <a:p>
+            <a:fld id="{14218910-390D-4E2D-864A-4A553316EEE1}" type="slidenum">
+              <a:rPr lang="fr-FR" smtClean="0"/>
+              <a:t>18</a:t>
+            </a:fld>
+            <a:endParaRPr lang="fr-FR"/>
+          </a:p>
+        </p:txBody>
+      </p:sp>
+    </p:spTree>
+    <p:extLst>
+      <p:ext uri="{BB962C8B-B14F-4D97-AF65-F5344CB8AC3E}">
+        <p14:creationId xmlns:p14="http://schemas.microsoft.com/office/powerpoint/2010/main" val="305030096"/>
+      </p:ext>
+    </p:extLst>
+  </p:cSld>
+  <p:clrMapOvr>
+    <a:masterClrMapping/>
+  </p:clrMapOvr>
+</p:notes>
+</file>
+
+<file path=ppt/notesSlides/notesSlide14.xml><?xml version="1.0" encoding="utf-8"?>
+<p:notes xmlns:a="http://schemas.openxmlformats.org/drawingml/2006/main" xmlns:r="http://schemas.openxmlformats.org/officeDocument/2006/relationships" xmlns:p="http://schemas.openxmlformats.org/presentationml/2006/main">
+  <p:cSld>
+    <p:spTree>
+      <p:nvGrpSpPr>
+        <p:cNvPr id="1" name=""/>
+        <p:cNvGrpSpPr/>
+        <p:nvPr/>
+      </p:nvGrpSpPr>
+      <p:grpSpPr>
+        <a:xfrm>
+          <a:off x="0" y="0"/>
+          <a:ext cx="0" cy="0"/>
+          <a:chOff x="0" y="0"/>
+          <a:chExt cx="0" cy="0"/>
+        </a:xfrm>
+      </p:grpSpPr>
+      <p:sp>
+        <p:nvSpPr>
+          <p:cNvPr id="2" name="Espace réservé de l'image des diapositives 1"/>
+          <p:cNvSpPr>
+            <a:spLocks noGrp="1" noRot="1" noChangeAspect="1"/>
+          </p:cNvSpPr>
+          <p:nvPr>
+            <p:ph type="sldImg"/>
+          </p:nvPr>
+        </p:nvSpPr>
+        <p:spPr/>
+      </p:sp>
+      <p:sp>
+        <p:nvSpPr>
+          <p:cNvPr id="3" name="Espace réservé des notes 2"/>
+          <p:cNvSpPr>
+            <a:spLocks noGrp="1"/>
+          </p:cNvSpPr>
+          <p:nvPr>
+            <p:ph type="body" idx="1"/>
+          </p:nvPr>
+        </p:nvSpPr>
+        <p:spPr/>
+        <p:txBody>
+          <a:bodyPr/>
+          <a:lstStyle/>
+          <a:p>
+            <a:r>
+              <a:rPr lang="fr-FR" dirty="0" smtClean="0"/>
+              <a:t>Après la compilation des notes données pour chacun de ces outils, nous choisissons Power BI qui est : Simple à utiliser. Beaucoup de formation disponible sur le web. Licence gratuite (plus de 2 semaines par rapport à Tableau) Beaucoup de fonctions et toutes les fonctions dont nous avons besoin pour accomplir nos tâches Facile à connecter à </a:t>
+            </a:r>
+            <a:r>
+              <a:rPr lang="fr-FR" dirty="0" err="1" smtClean="0"/>
+              <a:t>Hadoop</a:t>
+            </a:r>
+            <a:r>
+              <a:rPr lang="fr-FR" dirty="0" smtClean="0"/>
+              <a:t> </a:t>
+            </a:r>
+            <a:r>
+              <a:rPr lang="fr-FR" dirty="0" err="1" smtClean="0"/>
+              <a:t>datalake</a:t>
+            </a:r>
+            <a:r>
+              <a:rPr lang="fr-FR" dirty="0" smtClean="0"/>
+              <a:t>. Peut charger, traiter et construire graphique et rapport à partir de données énormes.</a:t>
+            </a:r>
+            <a:endParaRPr lang="fr-FR" dirty="0"/>
+          </a:p>
+        </p:txBody>
+      </p:sp>
+      <p:sp>
+        <p:nvSpPr>
+          <p:cNvPr id="4" name="Espace réservé du numéro de diapositive 3"/>
+          <p:cNvSpPr>
+            <a:spLocks noGrp="1"/>
+          </p:cNvSpPr>
+          <p:nvPr>
+            <p:ph type="sldNum" sz="quarter" idx="10"/>
+          </p:nvPr>
+        </p:nvSpPr>
+        <p:spPr/>
+        <p:txBody>
+          <a:bodyPr/>
+          <a:lstStyle/>
+          <a:p>
+            <a:fld id="{14218910-390D-4E2D-864A-4A553316EEE1}" type="slidenum">
+              <a:rPr lang="fr-FR" smtClean="0"/>
+              <a:t>19</a:t>
+            </a:fld>
+            <a:endParaRPr lang="fr-FR"/>
+          </a:p>
+        </p:txBody>
+      </p:sp>
+    </p:spTree>
+    <p:extLst>
+      <p:ext uri="{BB962C8B-B14F-4D97-AF65-F5344CB8AC3E}">
+        <p14:creationId xmlns:p14="http://schemas.microsoft.com/office/powerpoint/2010/main" val="4248387394"/>
+      </p:ext>
+    </p:extLst>
+  </p:cSld>
+  <p:clrMapOvr>
+    <a:masterClrMapping/>
+  </p:clrMapOvr>
+</p:notes>
+</file>
+
+<file path=ppt/notesSlides/notesSlide15.xml><?xml version="1.0" encoding="utf-8"?>
+<p:notes xmlns:a="http://schemas.openxmlformats.org/drawingml/2006/main" xmlns:r="http://schemas.openxmlformats.org/officeDocument/2006/relationships" xmlns:p="http://schemas.openxmlformats.org/presentationml/2006/main">
+  <p:cSld>
+    <p:spTree>
+      <p:nvGrpSpPr>
+        <p:cNvPr id="1" name=""/>
+        <p:cNvGrpSpPr/>
+        <p:nvPr/>
+      </p:nvGrpSpPr>
+      <p:grpSpPr>
+        <a:xfrm>
+          <a:off x="0" y="0"/>
+          <a:ext cx="0" cy="0"/>
+          <a:chOff x="0" y="0"/>
+          <a:chExt cx="0" cy="0"/>
+        </a:xfrm>
+      </p:grpSpPr>
+      <p:sp>
+        <p:nvSpPr>
+          <p:cNvPr id="2" name="Espace réservé de l'image des diapositives 1"/>
+          <p:cNvSpPr>
+            <a:spLocks noGrp="1" noRot="1" noChangeAspect="1"/>
+          </p:cNvSpPr>
+          <p:nvPr>
+            <p:ph type="sldImg"/>
+          </p:nvPr>
+        </p:nvSpPr>
+        <p:spPr/>
+      </p:sp>
+      <p:sp>
+        <p:nvSpPr>
+          <p:cNvPr id="3" name="Espace réservé des notes 2"/>
+          <p:cNvSpPr>
+            <a:spLocks noGrp="1"/>
+          </p:cNvSpPr>
+          <p:nvPr>
+            <p:ph type="body" idx="1"/>
+          </p:nvPr>
+        </p:nvSpPr>
+        <p:spPr/>
+        <p:txBody>
+          <a:bodyPr/>
+          <a:lstStyle/>
+          <a:p>
+            <a:pPr marL="0" marR="0" lvl="0" indent="0" algn="l" defTabSz="914400" rtl="0" eaLnBrk="1" fontAlgn="auto" latinLnBrk="0" hangingPunct="1">
+              <a:lnSpc>
+                <a:spcPct val="100000"/>
+              </a:lnSpc>
+              <a:spcBef>
+                <a:spcPts val="0"/>
+              </a:spcBef>
+              <a:spcAft>
+                <a:spcPts val="0"/>
+              </a:spcAft>
+              <a:buClrTx/>
+              <a:buSzTx/>
+              <a:buFontTx/>
+              <a:buNone/>
+              <a:tabLst/>
+              <a:defRPr/>
+            </a:pPr>
+            <a:r>
+              <a:rPr lang="fr-FR" dirty="0" smtClean="0"/>
+              <a:t>Afin de charger les données sur lesquelles les rapports et les graphiques sont basés, nous avons connecté l’outil de rapport Power BI sur la plate-forme </a:t>
+            </a:r>
+            <a:r>
+              <a:rPr lang="fr-FR" dirty="0" err="1" smtClean="0"/>
+              <a:t>Hive</a:t>
+            </a:r>
+            <a:r>
+              <a:rPr lang="fr-FR" dirty="0" smtClean="0"/>
+              <a:t> à l’aide d’un connecteur ODBC .</a:t>
+            </a:r>
+            <a:endParaRPr lang="fr-FR" dirty="0" smtClean="0"/>
+          </a:p>
+          <a:p>
+            <a:pPr marL="0" marR="0" lvl="0" indent="0" algn="l" defTabSz="914400" rtl="0" eaLnBrk="1" fontAlgn="auto" latinLnBrk="0" hangingPunct="1">
+              <a:lnSpc>
+                <a:spcPct val="100000"/>
+              </a:lnSpc>
+              <a:spcBef>
+                <a:spcPts val="0"/>
+              </a:spcBef>
+              <a:spcAft>
+                <a:spcPts val="0"/>
+              </a:spcAft>
+              <a:buClrTx/>
+              <a:buSzTx/>
+              <a:buFontTx/>
+              <a:buNone/>
+              <a:tabLst/>
+              <a:defRPr/>
+            </a:pPr>
+            <a:r>
+              <a:rPr lang="fr-FR" dirty="0" smtClean="0"/>
+              <a:t>A partir des données du </a:t>
+            </a:r>
+            <a:r>
+              <a:rPr lang="fr-FR" dirty="0" err="1" smtClean="0"/>
+              <a:t>datalake</a:t>
+            </a:r>
+            <a:r>
+              <a:rPr lang="fr-FR" dirty="0" smtClean="0"/>
+              <a:t> on avait besoin de </a:t>
+            </a:r>
+            <a:r>
+              <a:rPr lang="fr-FR" dirty="0" err="1" smtClean="0"/>
+              <a:t>generer</a:t>
+            </a:r>
+            <a:r>
+              <a:rPr lang="fr-FR" baseline="0" dirty="0" smtClean="0"/>
+              <a:t> des rapports, pour cela nous avons créé des tables sur </a:t>
+            </a:r>
+            <a:r>
+              <a:rPr lang="fr-FR" baseline="0" dirty="0" err="1" smtClean="0"/>
+              <a:t>hive</a:t>
+            </a:r>
+            <a:r>
+              <a:rPr lang="fr-FR" baseline="0" dirty="0" smtClean="0"/>
+              <a:t> (hue), en utilisant le connecteur </a:t>
+            </a:r>
+            <a:r>
+              <a:rPr lang="fr-FR" baseline="0" dirty="0" err="1" smtClean="0"/>
+              <a:t>Hadoop</a:t>
+            </a:r>
+            <a:r>
+              <a:rPr lang="fr-FR" baseline="0" dirty="0" smtClean="0"/>
+              <a:t> ODBC </a:t>
+            </a:r>
+            <a:r>
+              <a:rPr lang="fr-FR" baseline="0" dirty="0" err="1" smtClean="0"/>
+              <a:t>Hive</a:t>
+            </a:r>
+            <a:r>
+              <a:rPr lang="fr-FR" baseline="0" dirty="0" smtClean="0"/>
+              <a:t> de </a:t>
+            </a:r>
+            <a:r>
+              <a:rPr lang="fr-FR" baseline="0" dirty="0" err="1" smtClean="0"/>
+              <a:t>microsft</a:t>
+            </a:r>
+            <a:r>
+              <a:rPr lang="fr-FR" baseline="0" dirty="0" smtClean="0"/>
+              <a:t> on a exporté les données sur power BI via ce connecteur,</a:t>
+            </a:r>
+            <a:endParaRPr lang="fr-FR" dirty="0" smtClean="0"/>
+          </a:p>
+          <a:p>
+            <a:endParaRPr lang="fr-FR" dirty="0"/>
+          </a:p>
+        </p:txBody>
+      </p:sp>
+      <p:sp>
+        <p:nvSpPr>
+          <p:cNvPr id="4" name="Espace réservé du numéro de diapositive 3"/>
+          <p:cNvSpPr>
+            <a:spLocks noGrp="1"/>
+          </p:cNvSpPr>
+          <p:nvPr>
+            <p:ph type="sldNum" sz="quarter" idx="10"/>
+          </p:nvPr>
+        </p:nvSpPr>
+        <p:spPr/>
+        <p:txBody>
+          <a:bodyPr/>
+          <a:lstStyle/>
+          <a:p>
+            <a:fld id="{14218910-390D-4E2D-864A-4A553316EEE1}" type="slidenum">
+              <a:rPr lang="fr-FR" smtClean="0"/>
+              <a:t>20</a:t>
+            </a:fld>
+            <a:endParaRPr lang="fr-FR"/>
+          </a:p>
+        </p:txBody>
+      </p:sp>
+    </p:spTree>
+    <p:extLst>
+      <p:ext uri="{BB962C8B-B14F-4D97-AF65-F5344CB8AC3E}">
+        <p14:creationId xmlns:p14="http://schemas.microsoft.com/office/powerpoint/2010/main" val="240798185"/>
+      </p:ext>
+    </p:extLst>
+  </p:cSld>
+  <p:clrMapOvr>
+    <a:masterClrMapping/>
+  </p:clrMapOvr>
+</p:notes>
+</file>
+
+<file path=ppt/notesSlides/notesSlide16.xml><?xml version="1.0" encoding="utf-8"?>
 <p:notes xmlns:a="http://schemas.openxmlformats.org/drawingml/2006/main" xmlns:r="http://schemas.openxmlformats.org/officeDocument/2006/relationships" xmlns:p="http://schemas.openxmlformats.org/presentationml/2006/main">
   <p:cSld>
     <p:spTree>
@@ -10324,7 +13235,7 @@
           <a:p>
             <a:fld id="{14218910-390D-4E2D-864A-4A553316EEE1}" type="slidenum">
               <a:rPr lang="fr-FR" smtClean="0"/>
-              <a:t>26</a:t>
+              <a:t>25</a:t>
             </a:fld>
             <a:endParaRPr lang="fr-FR"/>
           </a:p>
@@ -10333,7 +13244,7 @@
     </p:spTree>
     <p:extLst>
       <p:ext uri="{BB962C8B-B14F-4D97-AF65-F5344CB8AC3E}">
-        <p14:creationId xmlns:p14="http://schemas.microsoft.com/office/powerpoint/2010/main" val="1265924633"/>
+        <p14:creationId xmlns:p14="http://schemas.microsoft.com/office/powerpoint/2010/main" val="3514312264"/>
       </p:ext>
     </p:extLst>
   </p:cSld>
@@ -10343,7 +13254,7 @@
 </p:notes>
 </file>
 
-<file path=ppt/notesSlides/notesSlide12.xml><?xml version="1.0" encoding="utf-8"?>
+<file path=ppt/notesSlides/notesSlide17.xml><?xml version="1.0" encoding="utf-8"?>
 <p:notes xmlns:a="http://schemas.openxmlformats.org/drawingml/2006/main" xmlns:r="http://schemas.openxmlformats.org/officeDocument/2006/relationships" xmlns:p="http://schemas.openxmlformats.org/presentationml/2006/main">
   <p:cSld>
     <p:spTree>
@@ -10387,14 +13298,6 @@
           <a:bodyPr/>
           <a:lstStyle/>
           <a:p>
-            <a:r>
-              <a:rPr lang="fr-FR" dirty="0" smtClean="0"/>
-              <a:t>Les modifications étant petites et nombreuses, plus la volumétrie relativement peu élevée,</a:t>
-            </a:r>
-            <a:r>
-              <a:rPr lang="fr-FR" baseline="0" dirty="0" smtClean="0"/>
-              <a:t> HDFS n’est pas adaptée. Perf. </a:t>
-            </a:r>
             <a:endParaRPr lang="fr-FR" dirty="0"/>
           </a:p>
         </p:txBody>
@@ -10416,7 +13319,7 @@
           <a:p>
             <a:fld id="{14218910-390D-4E2D-864A-4A553316EEE1}" type="slidenum">
               <a:rPr lang="fr-FR" smtClean="0"/>
-              <a:t>29</a:t>
+              <a:t>26</a:t>
             </a:fld>
             <a:endParaRPr lang="fr-FR"/>
           </a:p>
@@ -10425,7 +13328,7 @@
     </p:spTree>
     <p:extLst>
       <p:ext uri="{BB962C8B-B14F-4D97-AF65-F5344CB8AC3E}">
-        <p14:creationId xmlns:p14="http://schemas.microsoft.com/office/powerpoint/2010/main" val="1149301629"/>
+        <p14:creationId xmlns:p14="http://schemas.microsoft.com/office/powerpoint/2010/main" val="1265924633"/>
       </p:ext>
     </p:extLst>
   </p:cSld>
@@ -10435,7 +13338,7 @@
 </p:notes>
 </file>
 
-<file path=ppt/notesSlides/notesSlide13.xml><?xml version="1.0" encoding="utf-8"?>
+<file path=ppt/notesSlides/notesSlide18.xml><?xml version="1.0" encoding="utf-8"?>
 <p:notes xmlns:a="http://schemas.openxmlformats.org/drawingml/2006/main" xmlns:r="http://schemas.openxmlformats.org/officeDocument/2006/relationships" xmlns:p="http://schemas.openxmlformats.org/presentationml/2006/main">
   <p:cSld>
     <p:spTree>
@@ -10481,7 +13384,11 @@
           <a:p>
             <a:r>
               <a:rPr lang="fr-FR" dirty="0" smtClean="0"/>
-              <a:t>A supprimer????</a:t>
+              <a:t>Les modifications étant petites et nombreuses, plus la volumétrie relativement peu élevée,</a:t>
+            </a:r>
+            <a:r>
+              <a:rPr lang="fr-FR" baseline="0" dirty="0" smtClean="0"/>
+              <a:t> HDFS n’est pas adaptée. Perf. </a:t>
             </a:r>
             <a:endParaRPr lang="fr-FR" dirty="0"/>
           </a:p>
@@ -10504,6 +13411,94 @@
           <a:p>
             <a:fld id="{14218910-390D-4E2D-864A-4A553316EEE1}" type="slidenum">
               <a:rPr lang="fr-FR" smtClean="0"/>
+              <a:t>29</a:t>
+            </a:fld>
+            <a:endParaRPr lang="fr-FR"/>
+          </a:p>
+        </p:txBody>
+      </p:sp>
+    </p:spTree>
+    <p:extLst>
+      <p:ext uri="{BB962C8B-B14F-4D97-AF65-F5344CB8AC3E}">
+        <p14:creationId xmlns:p14="http://schemas.microsoft.com/office/powerpoint/2010/main" val="1149301629"/>
+      </p:ext>
+    </p:extLst>
+  </p:cSld>
+  <p:clrMapOvr>
+    <a:masterClrMapping/>
+  </p:clrMapOvr>
+</p:notes>
+</file>
+
+<file path=ppt/notesSlides/notesSlide19.xml><?xml version="1.0" encoding="utf-8"?>
+<p:notes xmlns:a="http://schemas.openxmlformats.org/drawingml/2006/main" xmlns:r="http://schemas.openxmlformats.org/officeDocument/2006/relationships" xmlns:p="http://schemas.openxmlformats.org/presentationml/2006/main">
+  <p:cSld>
+    <p:spTree>
+      <p:nvGrpSpPr>
+        <p:cNvPr id="1" name=""/>
+        <p:cNvGrpSpPr/>
+        <p:nvPr/>
+      </p:nvGrpSpPr>
+      <p:grpSpPr>
+        <a:xfrm>
+          <a:off x="0" y="0"/>
+          <a:ext cx="0" cy="0"/>
+          <a:chOff x="0" y="0"/>
+          <a:chExt cx="0" cy="0"/>
+        </a:xfrm>
+      </p:grpSpPr>
+      <p:sp>
+        <p:nvSpPr>
+          <p:cNvPr id="2" name="Espace réservé de l'image des diapositives 1"/>
+          <p:cNvSpPr>
+            <a:spLocks noGrp="1" noRot="1" noChangeAspect="1"/>
+          </p:cNvSpPr>
+          <p:nvPr>
+            <p:ph type="sldImg"/>
+          </p:nvPr>
+        </p:nvSpPr>
+        <p:spPr/>
+      </p:sp>
+      <p:sp>
+        <p:nvSpPr>
+          <p:cNvPr id="3" name="Espace réservé des commentaires 2"/>
+          <p:cNvSpPr>
+            <a:spLocks noGrp="1"/>
+          </p:cNvSpPr>
+          <p:nvPr>
+            <p:ph type="body" idx="1"/>
+          </p:nvPr>
+        </p:nvSpPr>
+        <p:spPr/>
+        <p:txBody>
+          <a:bodyPr/>
+          <a:lstStyle/>
+          <a:p>
+            <a:r>
+              <a:rPr lang="fr-FR" dirty="0" smtClean="0"/>
+              <a:t>A supprimer????</a:t>
+            </a:r>
+            <a:endParaRPr lang="fr-FR" dirty="0"/>
+          </a:p>
+        </p:txBody>
+      </p:sp>
+      <p:sp>
+        <p:nvSpPr>
+          <p:cNvPr id="4" name="Espace réservé du numéro de diapositive 3"/>
+          <p:cNvSpPr>
+            <a:spLocks noGrp="1"/>
+          </p:cNvSpPr>
+          <p:nvPr>
+            <p:ph type="sldNum" sz="quarter" idx="10"/>
+          </p:nvPr>
+        </p:nvSpPr>
+        <p:spPr/>
+        <p:txBody>
+          <a:bodyPr/>
+          <a:lstStyle/>
+          <a:p>
+            <a:fld id="{14218910-390D-4E2D-864A-4A553316EEE1}" type="slidenum">
+              <a:rPr lang="fr-FR" smtClean="0"/>
               <a:t>31</a:t>
             </a:fld>
             <a:endParaRPr lang="fr-FR"/>
@@ -10523,7 +13518,115 @@
 </p:notes>
 </file>
 
-<file path=ppt/notesSlides/notesSlide14.xml><?xml version="1.0" encoding="utf-8"?>
+<file path=ppt/notesSlides/notesSlide2.xml><?xml version="1.0" encoding="utf-8"?>
+<p:notes xmlns:a="http://schemas.openxmlformats.org/drawingml/2006/main" xmlns:r="http://schemas.openxmlformats.org/officeDocument/2006/relationships" xmlns:p="http://schemas.openxmlformats.org/presentationml/2006/main">
+  <p:cSld>
+    <p:spTree>
+      <p:nvGrpSpPr>
+        <p:cNvPr id="1" name=""/>
+        <p:cNvGrpSpPr/>
+        <p:nvPr/>
+      </p:nvGrpSpPr>
+      <p:grpSpPr>
+        <a:xfrm>
+          <a:off x="0" y="0"/>
+          <a:ext cx="0" cy="0"/>
+          <a:chOff x="0" y="0"/>
+          <a:chExt cx="0" cy="0"/>
+        </a:xfrm>
+      </p:grpSpPr>
+      <p:sp>
+        <p:nvSpPr>
+          <p:cNvPr id="2" name="Espace réservé de l'image des diapositives 1"/>
+          <p:cNvSpPr>
+            <a:spLocks noGrp="1" noRot="1" noChangeAspect="1"/>
+          </p:cNvSpPr>
+          <p:nvPr>
+            <p:ph type="sldImg"/>
+          </p:nvPr>
+        </p:nvSpPr>
+        <p:spPr/>
+      </p:sp>
+      <p:sp>
+        <p:nvSpPr>
+          <p:cNvPr id="3" name="Espace réservé des notes 2"/>
+          <p:cNvSpPr>
+            <a:spLocks noGrp="1"/>
+          </p:cNvSpPr>
+          <p:nvPr>
+            <p:ph type="body" idx="1"/>
+          </p:nvPr>
+        </p:nvSpPr>
+        <p:spPr/>
+        <p:txBody>
+          <a:bodyPr/>
+          <a:lstStyle/>
+          <a:p>
+            <a:r>
+              <a:rPr lang="fr-FR" dirty="0" smtClean="0"/>
+              <a:t>le processus d’importation, de transfert, de chargement et de traitement des données à des fins d’utilisation ou de stockage ultérieurs dans les données. consiste à se connecter à diverses sources de données, à extraire les données et à détecter les journaux de données modifiés, les applications, les médias sociaux </a:t>
+            </a:r>
+            <a:r>
+              <a:rPr lang="fr-FR" dirty="0" err="1" smtClean="0"/>
+              <a:t>Strming</a:t>
+            </a:r>
+            <a:r>
+              <a:rPr lang="fr-FR" dirty="0" smtClean="0"/>
+              <a:t> </a:t>
+            </a:r>
+            <a:r>
+              <a:rPr lang="fr-FR" dirty="0" err="1" smtClean="0"/>
+              <a:t>Datsocial</a:t>
+            </a:r>
+            <a:r>
+              <a:rPr lang="fr-FR" dirty="0" smtClean="0"/>
+              <a:t>, </a:t>
+            </a:r>
+            <a:r>
+              <a:rPr lang="fr-FR" dirty="0" err="1" smtClean="0"/>
+              <a:t>etc</a:t>
+            </a:r>
+            <a:endParaRPr lang="fr-FR" dirty="0"/>
+          </a:p>
+        </p:txBody>
+      </p:sp>
+      <p:sp>
+        <p:nvSpPr>
+          <p:cNvPr id="4" name="Espace réservé du numéro de diapositive 3"/>
+          <p:cNvSpPr>
+            <a:spLocks noGrp="1"/>
+          </p:cNvSpPr>
+          <p:nvPr>
+            <p:ph type="sldNum" sz="quarter" idx="10"/>
+          </p:nvPr>
+        </p:nvSpPr>
+        <p:spPr/>
+        <p:txBody>
+          <a:bodyPr/>
+          <a:lstStyle/>
+          <a:p>
+            <a:fld id="{14218910-390D-4E2D-864A-4A553316EEE1}" type="slidenum">
+              <a:rPr lang="fr-FR" smtClean="0"/>
+              <a:t>4</a:t>
+            </a:fld>
+            <a:endParaRPr lang="fr-FR"/>
+          </a:p>
+        </p:txBody>
+      </p:sp>
+    </p:spTree>
+    <p:extLst>
+      <p:ext uri="{BB962C8B-B14F-4D97-AF65-F5344CB8AC3E}">
+        <p14:creationId xmlns:p14="http://schemas.microsoft.com/office/powerpoint/2010/main" val="522342387"/>
+      </p:ext>
+    </p:extLst>
+  </p:cSld>
+  <p:clrMapOvr>
+    <a:masterClrMapping/>
+  </p:clrMapOvr>
+</p:notes>
+</file>
+
+<file path=ppt/notesSlides/notesSlide20.xml><?xml version="1.0" encoding="utf-8"?>
 <p:notes xmlns:a="http://schemas.openxmlformats.org/drawingml/2006/main" xmlns:r="http://schemas.openxmlformats.org/officeDocument/2006/relationships" xmlns:p="http://schemas.openxmlformats.org/presentationml/2006/main">
   <p:cSld>
     <p:spTree>
@@ -10618,90 +13721,6 @@
     <p:extLst>
       <p:ext uri="{BB962C8B-B14F-4D97-AF65-F5344CB8AC3E}">
         <p14:creationId xmlns:p14="http://schemas.microsoft.com/office/powerpoint/2010/main" val="3514139615"/>
-      </p:ext>
-    </p:extLst>
-  </p:cSld>
-  <p:clrMapOvr>
-    <a:masterClrMapping/>
-  </p:clrMapOvr>
-</p:notes>
-</file>
-
-<file path=ppt/notesSlides/notesSlide2.xml><?xml version="1.0" encoding="utf-8"?>
-<p:notes xmlns:a="http://schemas.openxmlformats.org/drawingml/2006/main" xmlns:r="http://schemas.openxmlformats.org/officeDocument/2006/relationships" xmlns:p="http://schemas.openxmlformats.org/presentationml/2006/main">
-  <p:cSld>
-    <p:spTree>
-      <p:nvGrpSpPr>
-        <p:cNvPr id="1" name=""/>
-        <p:cNvGrpSpPr/>
-        <p:nvPr/>
-      </p:nvGrpSpPr>
-      <p:grpSpPr>
-        <a:xfrm>
-          <a:off x="0" y="0"/>
-          <a:ext cx="0" cy="0"/>
-          <a:chOff x="0" y="0"/>
-          <a:chExt cx="0" cy="0"/>
-        </a:xfrm>
-      </p:grpSpPr>
-      <p:sp>
-        <p:nvSpPr>
-          <p:cNvPr id="2" name="Espace réservé de l'image des diapositives 1"/>
-          <p:cNvSpPr>
-            <a:spLocks noGrp="1" noRot="1" noChangeAspect="1"/>
-          </p:cNvSpPr>
-          <p:nvPr>
-            <p:ph type="sldImg"/>
-          </p:nvPr>
-        </p:nvSpPr>
-        <p:spPr/>
-      </p:sp>
-      <p:sp>
-        <p:nvSpPr>
-          <p:cNvPr id="3" name="Espace réservé des commentaires 2"/>
-          <p:cNvSpPr>
-            <a:spLocks noGrp="1"/>
-          </p:cNvSpPr>
-          <p:nvPr>
-            <p:ph type="body" idx="1"/>
-          </p:nvPr>
-        </p:nvSpPr>
-        <p:spPr/>
-        <p:txBody>
-          <a:bodyPr/>
-          <a:lstStyle/>
-          <a:p>
-            <a:endParaRPr lang="fr-FR" dirty="0"/>
-          </a:p>
-        </p:txBody>
-      </p:sp>
-      <p:sp>
-        <p:nvSpPr>
-          <p:cNvPr id="4" name="Espace réservé du numéro de diapositive 3"/>
-          <p:cNvSpPr>
-            <a:spLocks noGrp="1"/>
-          </p:cNvSpPr>
-          <p:nvPr>
-            <p:ph type="sldNum" sz="quarter" idx="10"/>
-          </p:nvPr>
-        </p:nvSpPr>
-        <p:spPr/>
-        <p:txBody>
-          <a:bodyPr/>
-          <a:lstStyle/>
-          <a:p>
-            <a:fld id="{14218910-390D-4E2D-864A-4A553316EEE1}" type="slidenum">
-              <a:rPr lang="fr-FR" smtClean="0"/>
-              <a:t>5</a:t>
-            </a:fld>
-            <a:endParaRPr lang="fr-FR"/>
-          </a:p>
-        </p:txBody>
-      </p:sp>
-    </p:spTree>
-    <p:extLst>
-      <p:ext uri="{BB962C8B-B14F-4D97-AF65-F5344CB8AC3E}">
-        <p14:creationId xmlns:p14="http://schemas.microsoft.com/office/powerpoint/2010/main" val="1147999949"/>
       </p:ext>
     </p:extLst>
   </p:cSld>
@@ -10776,7 +13795,7 @@
           <a:p>
             <a:fld id="{14218910-390D-4E2D-864A-4A553316EEE1}" type="slidenum">
               <a:rPr lang="fr-FR" smtClean="0"/>
-              <a:t>7</a:t>
+              <a:t>5</a:t>
             </a:fld>
             <a:endParaRPr lang="fr-FR"/>
           </a:p>
@@ -10785,7 +13804,7 @@
     </p:spTree>
     <p:extLst>
       <p:ext uri="{BB962C8B-B14F-4D97-AF65-F5344CB8AC3E}">
-        <p14:creationId xmlns:p14="http://schemas.microsoft.com/office/powerpoint/2010/main" val="279761521"/>
+        <p14:creationId xmlns:p14="http://schemas.microsoft.com/office/powerpoint/2010/main" val="1147999949"/>
       </p:ext>
     </p:extLst>
   </p:cSld>
@@ -10860,7 +13879,7 @@
           <a:p>
             <a:fld id="{14218910-390D-4E2D-864A-4A553316EEE1}" type="slidenum">
               <a:rPr lang="fr-FR" smtClean="0"/>
-              <a:t>8</a:t>
+              <a:t>7</a:t>
             </a:fld>
             <a:endParaRPr lang="fr-FR"/>
           </a:p>
@@ -10869,7 +13888,7 @@
     </p:spTree>
     <p:extLst>
       <p:ext uri="{BB962C8B-B14F-4D97-AF65-F5344CB8AC3E}">
-        <p14:creationId xmlns:p14="http://schemas.microsoft.com/office/powerpoint/2010/main" val="3688049503"/>
+        <p14:creationId xmlns:p14="http://schemas.microsoft.com/office/powerpoint/2010/main" val="279761521"/>
       </p:ext>
     </p:extLst>
   </p:cSld>
@@ -10923,7 +13942,7 @@
           <a:bodyPr/>
           <a:lstStyle/>
           <a:p>
-            <a:endParaRPr lang="fr-FR"/>
+            <a:endParaRPr lang="fr-FR" dirty="0"/>
           </a:p>
         </p:txBody>
       </p:sp>
@@ -10944,7 +13963,7 @@
           <a:p>
             <a:fld id="{14218910-390D-4E2D-864A-4A553316EEE1}" type="slidenum">
               <a:rPr lang="fr-FR" smtClean="0"/>
-              <a:t>9</a:t>
+              <a:t>8</a:t>
             </a:fld>
             <a:endParaRPr lang="fr-FR"/>
           </a:p>
@@ -10953,7 +13972,7 @@
     </p:spTree>
     <p:extLst>
       <p:ext uri="{BB962C8B-B14F-4D97-AF65-F5344CB8AC3E}">
-        <p14:creationId xmlns:p14="http://schemas.microsoft.com/office/powerpoint/2010/main" val="2931780832"/>
+        <p14:creationId xmlns:p14="http://schemas.microsoft.com/office/powerpoint/2010/main" val="3688049503"/>
       </p:ext>
     </p:extLst>
   </p:cSld>
@@ -11028,7 +14047,7 @@
           <a:p>
             <a:fld id="{14218910-390D-4E2D-864A-4A553316EEE1}" type="slidenum">
               <a:rPr lang="fr-FR" smtClean="0"/>
-              <a:t>10</a:t>
+              <a:t>9</a:t>
             </a:fld>
             <a:endParaRPr lang="fr-FR"/>
           </a:p>
@@ -11037,7 +14056,7 @@
     </p:spTree>
     <p:extLst>
       <p:ext uri="{BB962C8B-B14F-4D97-AF65-F5344CB8AC3E}">
-        <p14:creationId xmlns:p14="http://schemas.microsoft.com/office/powerpoint/2010/main" val="2760447778"/>
+        <p14:creationId xmlns:p14="http://schemas.microsoft.com/office/powerpoint/2010/main" val="2931780832"/>
       </p:ext>
     </p:extLst>
   </p:cSld>
@@ -11112,7 +14131,7 @@
           <a:p>
             <a:fld id="{14218910-390D-4E2D-864A-4A553316EEE1}" type="slidenum">
               <a:rPr lang="fr-FR" smtClean="0"/>
-              <a:t>11</a:t>
+              <a:t>10</a:t>
             </a:fld>
             <a:endParaRPr lang="fr-FR"/>
           </a:p>
@@ -11121,7 +14140,7 @@
     </p:spTree>
     <p:extLst>
       <p:ext uri="{BB962C8B-B14F-4D97-AF65-F5344CB8AC3E}">
-        <p14:creationId xmlns:p14="http://schemas.microsoft.com/office/powerpoint/2010/main" val="2847261589"/>
+        <p14:creationId xmlns:p14="http://schemas.microsoft.com/office/powerpoint/2010/main" val="2760447778"/>
       </p:ext>
     </p:extLst>
   </p:cSld>
@@ -11175,111 +14194,7 @@
           <a:bodyPr/>
           <a:lstStyle/>
           <a:p>
-            <a:pPr marL="0" marR="0" lvl="0" indent="0" algn="l" defTabSz="914400" rtl="0" eaLnBrk="1" fontAlgn="auto" latinLnBrk="0" hangingPunct="1">
-              <a:lnSpc>
-                <a:spcPct val="100000"/>
-              </a:lnSpc>
-              <a:spcBef>
-                <a:spcPts val="0"/>
-              </a:spcBef>
-              <a:spcAft>
-                <a:spcPts val="0"/>
-              </a:spcAft>
-              <a:buClrTx/>
-              <a:buSzTx/>
-              <a:buFontTx/>
-              <a:buNone/>
-              <a:tabLst/>
-              <a:defRPr/>
-            </a:pPr>
-            <a:endParaRPr lang="fr-FR" sz="1200" b="0" strike="noStrike" spc="-1" dirty="0" smtClean="0">
-              <a:solidFill>
-                <a:schemeClr val="accent2"/>
-              </a:solidFill>
-              <a:latin typeface="+mn-lt"/>
-            </a:endParaRPr>
-          </a:p>
-          <a:p>
-            <a:pPr marL="0" marR="0" lvl="0" indent="0" algn="l" defTabSz="914400" rtl="0" eaLnBrk="1" fontAlgn="auto" latinLnBrk="0" hangingPunct="1">
-              <a:lnSpc>
-                <a:spcPct val="100000"/>
-              </a:lnSpc>
-              <a:spcBef>
-                <a:spcPts val="0"/>
-              </a:spcBef>
-              <a:spcAft>
-                <a:spcPts val="0"/>
-              </a:spcAft>
-              <a:buClrTx/>
-              <a:buSzTx/>
-              <a:buFontTx/>
-              <a:buNone/>
-              <a:tabLst/>
-              <a:defRPr/>
-            </a:pPr>
-            <a:r>
-              <a:rPr lang="fr-FR" sz="1200" b="0" strike="noStrike" spc="-1" dirty="0" smtClean="0">
-                <a:solidFill>
-                  <a:schemeClr val="accent2"/>
-                </a:solidFill>
-                <a:latin typeface="+mn-lt"/>
-              </a:rPr>
-              <a:t>Les fichiers traités par le</a:t>
-            </a:r>
-            <a:r>
-              <a:rPr lang="fr-FR" sz="1200" b="0" strike="noStrike" spc="-1" baseline="0" dirty="0" smtClean="0">
-                <a:solidFill>
-                  <a:schemeClr val="accent2"/>
-                </a:solidFill>
-                <a:latin typeface="+mn-lt"/>
-              </a:rPr>
-              <a:t> processus d’ingestion sont mis dans le répertoire « </a:t>
-            </a:r>
-            <a:r>
-              <a:rPr lang="fr-FR" sz="1200" b="0" strike="noStrike" spc="-1" baseline="0" dirty="0" err="1" smtClean="0">
-                <a:solidFill>
-                  <a:schemeClr val="accent2"/>
-                </a:solidFill>
-                <a:latin typeface="+mn-lt"/>
-              </a:rPr>
-              <a:t>done</a:t>
-            </a:r>
-            <a:r>
-              <a:rPr lang="fr-FR" sz="1200" b="0" strike="noStrike" spc="-1" baseline="0" dirty="0" smtClean="0">
-                <a:solidFill>
-                  <a:schemeClr val="accent2"/>
-                </a:solidFill>
-                <a:latin typeface="+mn-lt"/>
-              </a:rPr>
-              <a:t> » afin de garder une traçabilité des fichiers traités et d’éviter de </a:t>
-            </a:r>
-            <a:r>
-              <a:rPr lang="fr-FR" sz="1200" b="0" strike="noStrike" spc="-1" baseline="0" dirty="0" err="1" smtClean="0">
-                <a:solidFill>
-                  <a:schemeClr val="accent2"/>
-                </a:solidFill>
-                <a:latin typeface="+mn-lt"/>
-              </a:rPr>
-              <a:t>réingérer</a:t>
-            </a:r>
-            <a:r>
-              <a:rPr lang="fr-FR" sz="1200" b="0" strike="noStrike" spc="-1" baseline="0" dirty="0" smtClean="0">
-                <a:solidFill>
-                  <a:schemeClr val="accent2"/>
-                </a:solidFill>
-                <a:latin typeface="+mn-lt"/>
-              </a:rPr>
-              <a:t> le fichier s’il était resté dans le répertoire.</a:t>
-            </a:r>
-            <a:endParaRPr lang="fr-FR" sz="1200" b="0" strike="noStrike" spc="-1" dirty="0" smtClean="0">
-              <a:solidFill>
-                <a:schemeClr val="accent2"/>
-              </a:solidFill>
-              <a:latin typeface="+mn-lt"/>
-            </a:endParaRPr>
-          </a:p>
-          <a:p>
-            <a:endParaRPr lang="fr-FR" dirty="0"/>
+            <a:endParaRPr lang="fr-FR"/>
           </a:p>
         </p:txBody>
       </p:sp>
@@ -11300,7 +14215,7 @@
           <a:p>
             <a:fld id="{14218910-390D-4E2D-864A-4A553316EEE1}" type="slidenum">
               <a:rPr lang="fr-FR" smtClean="0"/>
-              <a:t>13</a:t>
+              <a:t>11</a:t>
             </a:fld>
             <a:endParaRPr lang="fr-FR"/>
           </a:p>
@@ -11309,7 +14224,7 @@
     </p:spTree>
     <p:extLst>
       <p:ext uri="{BB962C8B-B14F-4D97-AF65-F5344CB8AC3E}">
-        <p14:creationId xmlns:p14="http://schemas.microsoft.com/office/powerpoint/2010/main" val="2535596267"/>
+        <p14:creationId xmlns:p14="http://schemas.microsoft.com/office/powerpoint/2010/main" val="2847261589"/>
       </p:ext>
     </p:extLst>
   </p:cSld>
@@ -11380,150 +14295,12 @@
               <a:tabLst/>
               <a:defRPr/>
             </a:pPr>
-            <a:r>
-              <a:rPr lang="fr-FR" sz="1200" spc="-1" dirty="0" err="1" smtClean="0">
-                <a:solidFill>
-                  <a:schemeClr val="accent2"/>
-                </a:solidFill>
-                <a:latin typeface="+mn-lt"/>
-              </a:rPr>
-              <a:t>Transformed</a:t>
-            </a:r>
-            <a:r>
-              <a:rPr lang="fr-FR" sz="1200" spc="-1" dirty="0" smtClean="0">
-                <a:solidFill>
-                  <a:schemeClr val="accent2"/>
-                </a:solidFill>
-                <a:latin typeface="+mn-lt"/>
-              </a:rPr>
-              <a:t> files are </a:t>
-            </a:r>
-            <a:r>
-              <a:rPr lang="fr-FR" sz="1200" spc="-1" dirty="0" err="1" smtClean="0">
-                <a:solidFill>
-                  <a:schemeClr val="accent2"/>
-                </a:solidFill>
-                <a:latin typeface="+mn-lt"/>
-              </a:rPr>
-              <a:t>stored</a:t>
-            </a:r>
-            <a:r>
-              <a:rPr lang="fr-FR" sz="1200" spc="-1" dirty="0" smtClean="0">
-                <a:solidFill>
-                  <a:schemeClr val="accent2"/>
-                </a:solidFill>
-                <a:latin typeface="+mn-lt"/>
-              </a:rPr>
-              <a:t> </a:t>
-            </a:r>
-            <a:r>
-              <a:rPr lang="fr-FR" sz="1200" spc="-1" dirty="0" err="1" smtClean="0">
-                <a:solidFill>
-                  <a:schemeClr val="accent2"/>
-                </a:solidFill>
-                <a:latin typeface="+mn-lt"/>
-              </a:rPr>
-              <a:t>into</a:t>
-            </a:r>
-            <a:r>
-              <a:rPr lang="fr-FR" sz="1200" spc="-1" dirty="0" smtClean="0">
-                <a:solidFill>
-                  <a:schemeClr val="accent2"/>
-                </a:solidFill>
-                <a:latin typeface="+mn-lt"/>
-              </a:rPr>
-              <a:t> a </a:t>
-            </a:r>
-            <a:r>
-              <a:rPr lang="fr-FR" sz="1200" spc="-1" dirty="0" err="1" smtClean="0">
-                <a:solidFill>
-                  <a:schemeClr val="accent2"/>
-                </a:solidFill>
-                <a:latin typeface="+mn-lt"/>
-              </a:rPr>
-              <a:t>specific</a:t>
-            </a:r>
-            <a:r>
-              <a:rPr lang="fr-FR" sz="1200" spc="-1" dirty="0" smtClean="0">
-                <a:solidFill>
-                  <a:schemeClr val="accent2"/>
-                </a:solidFill>
-                <a:latin typeface="+mn-lt"/>
-              </a:rPr>
-              <a:t> </a:t>
-            </a:r>
-            <a:r>
-              <a:rPr lang="fr-FR" sz="1200" spc="-1" dirty="0" err="1" smtClean="0">
-                <a:solidFill>
-                  <a:schemeClr val="accent2"/>
-                </a:solidFill>
-                <a:latin typeface="+mn-lt"/>
-              </a:rPr>
-              <a:t>folder</a:t>
-            </a:r>
-            <a:r>
-              <a:rPr lang="fr-FR" sz="1200" spc="-1" dirty="0" smtClean="0">
-                <a:solidFill>
-                  <a:schemeClr val="accent2"/>
-                </a:solidFill>
-                <a:latin typeface="+mn-lt"/>
-              </a:rPr>
-              <a:t> on the cluster. This </a:t>
-            </a:r>
-            <a:r>
-              <a:rPr lang="fr-FR" sz="1200" spc="-1" dirty="0" err="1" smtClean="0">
-                <a:solidFill>
-                  <a:schemeClr val="accent2"/>
-                </a:solidFill>
-                <a:latin typeface="+mn-lt"/>
-              </a:rPr>
-              <a:t>folder</a:t>
-            </a:r>
-            <a:r>
-              <a:rPr lang="fr-FR" sz="1200" spc="-1" dirty="0" smtClean="0">
-                <a:solidFill>
-                  <a:schemeClr val="accent2"/>
-                </a:solidFill>
-                <a:latin typeface="+mn-lt"/>
-              </a:rPr>
-              <a:t> </a:t>
-            </a:r>
-            <a:r>
-              <a:rPr lang="fr-FR" sz="1200" spc="-1" dirty="0" err="1" smtClean="0">
-                <a:solidFill>
-                  <a:schemeClr val="accent2"/>
-                </a:solidFill>
-                <a:latin typeface="+mn-lt"/>
-              </a:rPr>
-              <a:t>is</a:t>
-            </a:r>
-            <a:r>
-              <a:rPr lang="fr-FR" sz="1200" spc="-1" dirty="0" smtClean="0">
-                <a:solidFill>
-                  <a:schemeClr val="accent2"/>
-                </a:solidFill>
-                <a:latin typeface="+mn-lt"/>
-              </a:rPr>
-              <a:t> « </a:t>
-            </a:r>
-            <a:r>
-              <a:rPr lang="fr-FR" sz="1200" spc="-1" dirty="0" err="1" smtClean="0">
-                <a:solidFill>
-                  <a:schemeClr val="accent2"/>
-                </a:solidFill>
-                <a:latin typeface="+mn-lt"/>
-              </a:rPr>
-              <a:t>lake</a:t>
-            </a:r>
-            <a:r>
-              <a:rPr lang="fr-FR" sz="1200" spc="-1" dirty="0" smtClean="0">
-                <a:solidFill>
-                  <a:schemeClr val="accent2"/>
-                </a:solidFill>
-                <a:latin typeface="+mn-lt"/>
-              </a:rPr>
-              <a:t> ».</a:t>
-            </a:r>
+            <a:endParaRPr lang="fr-FR" sz="1200" b="0" strike="noStrike" spc="-1" dirty="0" smtClean="0">
+              <a:solidFill>
+                <a:schemeClr val="accent2"/>
+              </a:solidFill>
+              <a:latin typeface="+mn-lt"/>
+            </a:endParaRPr>
           </a:p>
           <a:p>
             <a:pPr marL="0" marR="0" lvl="0" indent="0" algn="l" defTabSz="914400" rtl="0" eaLnBrk="1" fontAlgn="auto" latinLnBrk="0" hangingPunct="1">
@@ -11543,165 +14320,61 @@
               <a:tabLst/>
               <a:defRPr/>
             </a:pPr>
-            <a:endParaRPr lang="fr-FR" sz="1200" spc="-1" dirty="0" smtClean="0">
-              <a:solidFill>
-                <a:schemeClr val="accent2"/>
-              </a:solidFill>
-              <a:latin typeface="+mn-lt"/>
-            </a:endParaRPr>
-          </a:p>
-          <a:p>
-            <a:pPr marL="0" marR="0" lvl="0" indent="0" algn="l" defTabSz="914400" rtl="0" eaLnBrk="1" fontAlgn="auto" latinLnBrk="0" hangingPunct="1">
-              <a:lnSpc>
-                <a:spcPct val="100000"/>
-              </a:lnSpc>
-              <a:spcBef>
-                <a:spcPts val="0"/>
-              </a:spcBef>
-              <a:spcAft>
-                <a:spcPts val="0"/>
-              </a:spcAft>
-              <a:buClrTx/>
-              <a:buSzTx/>
-              <a:buFontTx/>
-              <a:buNone/>
-              <a:tabLst/>
-              <a:defRPr/>
-            </a:pPr>
-            <a:r>
-              <a:rPr lang="fr-FR" sz="1200" spc="-1" dirty="0" smtClean="0">
+            <a:r>
+              <a:rPr lang="fr-FR" sz="1200" b="0" strike="noStrike" spc="-1" dirty="0" smtClean="0">
                 <a:solidFill>
                   <a:schemeClr val="accent2"/>
                 </a:solidFill>
                 <a:latin typeface="+mn-lt"/>
               </a:rPr>
-              <a:t>The parquet files </a:t>
-            </a:r>
-            <a:r>
-              <a:rPr lang="fr-FR" sz="1200" spc="-1" dirty="0" err="1" smtClean="0">
+              <a:t>Les fichiers traités par le</a:t>
+            </a:r>
+            <a:r>
+              <a:rPr lang="fr-FR" sz="1200" b="0" strike="noStrike" spc="-1" baseline="0" dirty="0" smtClean="0">
                 <a:solidFill>
                   <a:schemeClr val="accent2"/>
                 </a:solidFill>
                 <a:latin typeface="+mn-lt"/>
               </a:rPr>
-              <a:t>will</a:t>
-            </a:r>
-            <a:r>
-              <a:rPr lang="fr-FR" sz="1200" spc="-1" dirty="0" smtClean="0">
+              <a:t> processus d’ingestion sont mis dans le répertoire « </a:t>
+            </a:r>
+            <a:r>
+              <a:rPr lang="fr-FR" sz="1200" b="0" strike="noStrike" spc="-1" baseline="0" dirty="0" err="1" smtClean="0">
                 <a:solidFill>
                   <a:schemeClr val="accent2"/>
                 </a:solidFill>
                 <a:latin typeface="+mn-lt"/>
               </a:rPr>
-              <a:t> </a:t>
-            </a:r>
-            <a:r>
-              <a:rPr lang="fr-FR" sz="1200" spc="-1" dirty="0" err="1" smtClean="0">
+              <a:t>done</a:t>
+            </a:r>
+            <a:r>
+              <a:rPr lang="fr-FR" sz="1200" b="0" strike="noStrike" spc="-1" baseline="0" dirty="0" smtClean="0">
                 <a:solidFill>
                   <a:schemeClr val="accent2"/>
                 </a:solidFill>
                 <a:latin typeface="+mn-lt"/>
               </a:rPr>
-              <a:t>be</a:t>
-            </a:r>
-            <a:r>
-              <a:rPr lang="fr-FR" sz="1200" spc="-1" dirty="0" smtClean="0">
+              <a:t> » afin de garder une traçabilité des fichiers traités et d’éviter de </a:t>
+            </a:r>
+            <a:r>
+              <a:rPr lang="fr-FR" sz="1200" b="0" strike="noStrike" spc="-1" baseline="0" dirty="0" err="1" smtClean="0">
                 <a:solidFill>
                   <a:schemeClr val="accent2"/>
                 </a:solidFill>
                 <a:latin typeface="+mn-lt"/>
               </a:rPr>
-              <a:t> </a:t>
-            </a:r>
-            <a:r>
-              <a:rPr lang="fr-FR" sz="1200" spc="-1" dirty="0" err="1" smtClean="0">
+              <a:t>réingérer</a:t>
+            </a:r>
+            <a:r>
+              <a:rPr lang="fr-FR" sz="1200" b="0" strike="noStrike" spc="-1" baseline="0" dirty="0" smtClean="0">
                 <a:solidFill>
                   <a:schemeClr val="accent2"/>
                 </a:solidFill>
                 <a:latin typeface="+mn-lt"/>
               </a:rPr>
-              <a:t>regenerated</a:t>
-            </a:r>
-            <a:r>
-              <a:rPr lang="fr-FR" sz="1200" spc="-1" dirty="0" smtClean="0">
-                <a:solidFill>
-                  <a:schemeClr val="accent2"/>
-                </a:solidFill>
-                <a:latin typeface="+mn-lt"/>
-              </a:rPr>
-              <a:t> </a:t>
-            </a:r>
-            <a:r>
-              <a:rPr lang="fr-FR" sz="1200" spc="-1" dirty="0" err="1" smtClean="0">
-                <a:solidFill>
-                  <a:schemeClr val="accent2"/>
-                </a:solidFill>
-                <a:latin typeface="+mn-lt"/>
-              </a:rPr>
-              <a:t>each</a:t>
-            </a:r>
-            <a:r>
-              <a:rPr lang="fr-FR" sz="1200" spc="-1" dirty="0" smtClean="0">
-                <a:solidFill>
-                  <a:schemeClr val="accent2"/>
-                </a:solidFill>
-                <a:latin typeface="+mn-lt"/>
-              </a:rPr>
-              <a:t> time the workflow </a:t>
-            </a:r>
-            <a:r>
-              <a:rPr lang="fr-FR" sz="1200" spc="-1" dirty="0" err="1" smtClean="0">
-                <a:solidFill>
-                  <a:schemeClr val="accent2"/>
-                </a:solidFill>
-                <a:latin typeface="+mn-lt"/>
-              </a:rPr>
-              <a:t>will</a:t>
-            </a:r>
-            <a:r>
-              <a:rPr lang="fr-FR" sz="1200" spc="-1" dirty="0" smtClean="0">
-                <a:solidFill>
-                  <a:schemeClr val="accent2"/>
-                </a:solidFill>
-                <a:latin typeface="+mn-lt"/>
-              </a:rPr>
-              <a:t> </a:t>
-            </a:r>
-            <a:r>
-              <a:rPr lang="fr-FR" sz="1200" spc="-1" dirty="0" err="1" smtClean="0">
-                <a:solidFill>
-                  <a:schemeClr val="accent2"/>
-                </a:solidFill>
-                <a:latin typeface="+mn-lt"/>
-              </a:rPr>
-              <a:t>run</a:t>
-            </a:r>
-            <a:endParaRPr lang="fr-FR" sz="1600" b="0" strike="noStrike" spc="-1" dirty="0" smtClean="0">
-              <a:solidFill>
-                <a:srgbClr val="000000"/>
-              </a:solidFill>
-              <a:latin typeface="+mn-lt"/>
-            </a:endParaRPr>
-          </a:p>
-          <a:p>
-            <a:pPr marL="0" marR="0" lvl="0" indent="0" algn="l" defTabSz="914400" rtl="0" eaLnBrk="1" fontAlgn="auto" latinLnBrk="0" hangingPunct="1">
-              <a:lnSpc>
-                <a:spcPct val="100000"/>
-              </a:lnSpc>
-              <a:spcBef>
-                <a:spcPts val="0"/>
-              </a:spcBef>
-              <a:spcAft>
-                <a:spcPts val="0"/>
-              </a:spcAft>
-              <a:buClrTx/>
-              <a:buSzTx/>
-              <a:buFontTx/>
-              <a:buNone/>
-              <a:tabLst/>
-              <a:defRPr/>
-            </a:pPr>
-            <a:endParaRPr lang="fr-FR" sz="1200" spc="-1" dirty="0" smtClean="0">
+              <a:t> le fichier s’il était resté dans le répertoire.</a:t>
+            </a:r>
+            <a:endParaRPr lang="fr-FR" sz="1200" b="0" strike="noStrike" spc="-1" dirty="0" smtClean="0">
               <a:solidFill>
                 <a:schemeClr val="accent2"/>
               </a:solidFill>
@@ -11730,7 +14403,7 @@
           <a:p>
             <a:fld id="{14218910-390D-4E2D-864A-4A553316EEE1}" type="slidenum">
               <a:rPr lang="fr-FR" smtClean="0"/>
-              <a:t>14</a:t>
+              <a:t>13</a:t>
             </a:fld>
             <a:endParaRPr lang="fr-FR"/>
           </a:p>
@@ -11739,7 +14412,7 @@
     </p:spTree>
     <p:extLst>
       <p:ext uri="{BB962C8B-B14F-4D97-AF65-F5344CB8AC3E}">
-        <p14:creationId xmlns:p14="http://schemas.microsoft.com/office/powerpoint/2010/main" val="3558579104"/>
+        <p14:creationId xmlns:p14="http://schemas.microsoft.com/office/powerpoint/2010/main" val="2535596267"/>
       </p:ext>
     </p:extLst>
   </p:cSld>
@@ -25984,7 +28657,7 @@
                   <a:srgbClr val="FF0000"/>
                 </a:solidFill>
                 <a:latin typeface="Calibri"/>
-                <a:hlinkClick r:id="rId2"/>
+                <a:hlinkClick r:id="rId3"/>
               </a:rPr>
               <a:t>Scripts </a:t>
             </a:r>
@@ -25994,7 +28667,7 @@
                   <a:srgbClr val="FF0000"/>
                 </a:solidFill>
                 <a:latin typeface="Calibri"/>
-                <a:hlinkClick r:id="rId2"/>
+                <a:hlinkClick r:id="rId3"/>
               </a:rPr>
               <a:t>: </a:t>
             </a:r>
@@ -26004,7 +28677,7 @@
                   <a:srgbClr val="FF0000"/>
                 </a:solidFill>
                 <a:latin typeface="Calibri"/>
-                <a:hlinkClick r:id="rId2"/>
+                <a:hlinkClick r:id="rId3"/>
               </a:rPr>
               <a:t>Appendix</a:t>
             </a:r>
@@ -26014,7 +28687,7 @@
                   <a:srgbClr val="FF0000"/>
                 </a:solidFill>
                 <a:latin typeface="Calibri"/>
-                <a:hlinkClick r:id="rId2"/>
+                <a:hlinkClick r:id="rId3"/>
               </a:rPr>
               <a:t> </a:t>
             </a:r>
@@ -26024,7 +28697,7 @@
                   <a:srgbClr val="FF0000"/>
                 </a:solidFill>
                 <a:latin typeface="Calibri"/>
-                <a:hlinkClick r:id="rId2"/>
+                <a:hlinkClick r:id="rId3"/>
               </a:rPr>
               <a:t>1.3.1 - </a:t>
             </a:r>
@@ -26034,7 +28707,7 @@
                   <a:srgbClr val="FF0000"/>
                 </a:solidFill>
                 <a:latin typeface="Calibri"/>
-                <a:hlinkClick r:id="rId2"/>
+                <a:hlinkClick r:id="rId3"/>
               </a:rPr>
               <a:t>External</a:t>
             </a:r>
@@ -26044,7 +28717,7 @@
                   <a:srgbClr val="FF0000"/>
                 </a:solidFill>
                 <a:latin typeface="Calibri"/>
-                <a:hlinkClick r:id="rId2"/>
+                <a:hlinkClick r:id="rId3"/>
               </a:rPr>
               <a:t> table</a:t>
             </a:r>
@@ -26075,7 +28748,7 @@
                   <a:srgbClr val="FF0000"/>
                 </a:solidFill>
                 <a:latin typeface="Calibri"/>
-                <a:hlinkClick r:id="rId3"/>
+                <a:hlinkClick r:id="rId4"/>
               </a:rPr>
               <a:t>Ex : </a:t>
             </a:r>
@@ -26085,7 +28758,7 @@
                   <a:srgbClr val="FF0000"/>
                 </a:solidFill>
                 <a:latin typeface="Calibri"/>
-                <a:hlinkClick r:id="rId3"/>
+                <a:hlinkClick r:id="rId4"/>
               </a:rPr>
               <a:t>last_jo_avg_age</a:t>
             </a:r>
@@ -26095,7 +28768,7 @@
                   <a:srgbClr val="FF0000"/>
                 </a:solidFill>
                 <a:latin typeface="Calibri"/>
-                <a:hlinkClick r:id="rId3"/>
+                <a:hlinkClick r:id="rId4"/>
               </a:rPr>
               <a:t>:</a:t>
             </a:r>
@@ -26111,7 +28784,7 @@
           <p:nvPr/>
         </p:nvPicPr>
         <p:blipFill>
-          <a:blip r:embed="rId4" cstate="print">
+          <a:blip r:embed="rId5" cstate="print">
             <a:extLst>
               <a:ext uri="{28A0092B-C50C-407E-A947-70E740481C1C}">
                 <a14:useLocalDpi xmlns:a14="http://schemas.microsoft.com/office/drawing/2010/main" val="0"/>
@@ -26718,7 +29391,7 @@
         </p:xfrm>
         <a:graphic>
           <a:graphicData uri="http://schemas.openxmlformats.org/drawingml/2006/diagram">
-            <dgm:relIds xmlns:dgm="http://schemas.openxmlformats.org/drawingml/2006/diagram" xmlns:r="http://schemas.openxmlformats.org/officeDocument/2006/relationships" r:dm="rId2" r:lo="rId3" r:qs="rId4" r:cs="rId5"/>
+            <dgm:relIds xmlns:dgm="http://schemas.openxmlformats.org/drawingml/2006/diagram" xmlns:r="http://schemas.openxmlformats.org/officeDocument/2006/relationships" r:dm="rId3" r:lo="rId4" r:qs="rId5" r:cs="rId6"/>
           </a:graphicData>
         </a:graphic>
       </p:graphicFrame>
@@ -26731,7 +29404,7 @@
           <p:nvPr/>
         </p:nvPicPr>
         <p:blipFill>
-          <a:blip r:embed="rId7"/>
+          <a:blip r:embed="rId8"/>
           <a:stretch>
             <a:fillRect/>
           </a:stretch>
@@ -27272,7 +29945,7 @@
           <p:nvPr/>
         </p:nvPicPr>
         <p:blipFill>
-          <a:blip r:embed="rId2"/>
+          <a:blip r:embed="rId3"/>
           <a:stretch>
             <a:fillRect/>
           </a:stretch>
@@ -27296,7 +29969,7 @@
           <p:nvPr/>
         </p:nvPicPr>
         <p:blipFill>
-          <a:blip r:embed="rId3"/>
+          <a:blip r:embed="rId4"/>
           <a:stretch>
             <a:fillRect/>
           </a:stretch>
@@ -27320,7 +29993,7 @@
           <p:nvPr/>
         </p:nvPicPr>
         <p:blipFill>
-          <a:blip r:embed="rId4"/>
+          <a:blip r:embed="rId5"/>
           <a:stretch>
             <a:fillRect/>
           </a:stretch>
@@ -27344,7 +30017,7 @@
           <p:nvPr/>
         </p:nvPicPr>
         <p:blipFill>
-          <a:blip r:embed="rId5"/>
+          <a:blip r:embed="rId6"/>
           <a:stretch>
             <a:fillRect/>
           </a:stretch>
@@ -27886,7 +30559,7 @@
           <p:nvPr/>
         </p:nvPicPr>
         <p:blipFill>
-          <a:blip r:embed="rId2"/>
+          <a:blip r:embed="rId3"/>
           <a:stretch>
             <a:fillRect/>
           </a:stretch>
@@ -28451,7 +31124,7 @@
           <p:nvPr/>
         </p:nvPicPr>
         <p:blipFill>
-          <a:blip r:embed="rId2">
+          <a:blip r:embed="rId3">
             <a:extLst>
               <a:ext uri="{28A0092B-C50C-407E-A947-70E740481C1C}">
                 <a14:useLocalDpi xmlns:a14="http://schemas.microsoft.com/office/drawing/2010/main" val="0"/>
@@ -28481,7 +31154,7 @@
           <p:nvPr/>
         </p:nvPicPr>
         <p:blipFill>
-          <a:blip r:embed="rId3" cstate="print">
+          <a:blip r:embed="rId4" cstate="print">
             <a:extLst>
               <a:ext uri="{28A0092B-C50C-407E-A947-70E740481C1C}">
                 <a14:useLocalDpi xmlns:a14="http://schemas.microsoft.com/office/drawing/2010/main" val="0"/>
@@ -31043,8 +33716,9 @@
             <a:pPr algn="ctr"/>
             <a:r>
               <a:rPr lang="fr-FR" dirty="0" smtClean="0"/>
-              <a:t>WINTER_2016</a:t>
-            </a:r>
+              <a:t>Summer-2016</a:t>
+            </a:r>
+            <a:endParaRPr lang="fr-FR" dirty="0" smtClean="0"/>
           </a:p>
         </p:txBody>
       </p:sp>
@@ -31221,7 +33895,7 @@
         </p:nvSpPr>
         <p:spPr>
           <a:xfrm>
-            <a:off x="4989222" y="3034146"/>
+            <a:off x="5003077" y="5382693"/>
             <a:ext cx="2163908" cy="836650"/>
           </a:xfrm>
           <a:prstGeom prst="cloud">
@@ -33920,35 +36594,35 @@
                 <a:gridCol w="1484412">
                   <a:extLst>
                     <a:ext uri="{9D8B030D-6E8A-4147-A177-3AD203B41FA5}">
-                      <a16:colId xmlns="" xmlns:a16="http://schemas.microsoft.com/office/drawing/2014/main" val="20000"/>
+                      <a16:colId xmlns:a16="http://schemas.microsoft.com/office/drawing/2014/main" val="20000"/>
                     </a:ext>
                   </a:extLst>
                 </a:gridCol>
                 <a:gridCol w="890731">
                   <a:extLst>
                     <a:ext uri="{9D8B030D-6E8A-4147-A177-3AD203B41FA5}">
-                      <a16:colId xmlns="" xmlns:a16="http://schemas.microsoft.com/office/drawing/2014/main" val="20001"/>
+                      <a16:colId xmlns:a16="http://schemas.microsoft.com/office/drawing/2014/main" val="20001"/>
                     </a:ext>
                   </a:extLst>
                 </a:gridCol>
                 <a:gridCol w="1410254">
                   <a:extLst>
                     <a:ext uri="{9D8B030D-6E8A-4147-A177-3AD203B41FA5}">
-                      <a16:colId xmlns="" xmlns:a16="http://schemas.microsoft.com/office/drawing/2014/main" val="20002"/>
+                      <a16:colId xmlns:a16="http://schemas.microsoft.com/office/drawing/2014/main" val="20002"/>
                     </a:ext>
                   </a:extLst>
                 </a:gridCol>
                 <a:gridCol w="1458709">
                   <a:extLst>
                     <a:ext uri="{9D8B030D-6E8A-4147-A177-3AD203B41FA5}">
-                      <a16:colId xmlns="" xmlns:a16="http://schemas.microsoft.com/office/drawing/2014/main" val="20003"/>
+                      <a16:colId xmlns:a16="http://schemas.microsoft.com/office/drawing/2014/main" val="20003"/>
                     </a:ext>
                   </a:extLst>
                 </a:gridCol>
                 <a:gridCol w="1503794">
                   <a:extLst>
                     <a:ext uri="{9D8B030D-6E8A-4147-A177-3AD203B41FA5}">
-                      <a16:colId xmlns="" xmlns:a16="http://schemas.microsoft.com/office/drawing/2014/main" val="20004"/>
+                      <a16:colId xmlns:a16="http://schemas.microsoft.com/office/drawing/2014/main" val="20004"/>
                     </a:ext>
                   </a:extLst>
                 </a:gridCol>
@@ -34206,7 +36880,7 @@
                 </a:tc>
                 <a:extLst>
                   <a:ext uri="{0D108BD9-81ED-4DB2-BD59-A6C34878D82A}">
-                    <a16:rowId xmlns="" xmlns:a16="http://schemas.microsoft.com/office/drawing/2014/main" val="10000"/>
+                    <a16:rowId xmlns:a16="http://schemas.microsoft.com/office/drawing/2014/main" val="10000"/>
                   </a:ext>
                 </a:extLst>
               </a:tr>
@@ -34463,7 +37137,7 @@
                 </a:tc>
                 <a:extLst>
                   <a:ext uri="{0D108BD9-81ED-4DB2-BD59-A6C34878D82A}">
-                    <a16:rowId xmlns="" xmlns:a16="http://schemas.microsoft.com/office/drawing/2014/main" val="10001"/>
+                    <a16:rowId xmlns:a16="http://schemas.microsoft.com/office/drawing/2014/main" val="10001"/>
                   </a:ext>
                 </a:extLst>
               </a:tr>
@@ -34720,7 +37394,7 @@
                 </a:tc>
                 <a:extLst>
                   <a:ext uri="{0D108BD9-81ED-4DB2-BD59-A6C34878D82A}">
-                    <a16:rowId xmlns="" xmlns:a16="http://schemas.microsoft.com/office/drawing/2014/main" val="10002"/>
+                    <a16:rowId xmlns:a16="http://schemas.microsoft.com/office/drawing/2014/main" val="10002"/>
                   </a:ext>
                 </a:extLst>
               </a:tr>
@@ -34977,7 +37651,7 @@
                 </a:tc>
                 <a:extLst>
                   <a:ext uri="{0D108BD9-81ED-4DB2-BD59-A6C34878D82A}">
-                    <a16:rowId xmlns="" xmlns:a16="http://schemas.microsoft.com/office/drawing/2014/main" val="10003"/>
+                    <a16:rowId xmlns:a16="http://schemas.microsoft.com/office/drawing/2014/main" val="10003"/>
                   </a:ext>
                 </a:extLst>
               </a:tr>
@@ -35234,7 +37908,7 @@
                 </a:tc>
                 <a:extLst>
                   <a:ext uri="{0D108BD9-81ED-4DB2-BD59-A6C34878D82A}">
-                    <a16:rowId xmlns="" xmlns:a16="http://schemas.microsoft.com/office/drawing/2014/main" val="10004"/>
+                    <a16:rowId xmlns:a16="http://schemas.microsoft.com/office/drawing/2014/main" val="10004"/>
                   </a:ext>
                 </a:extLst>
               </a:tr>
@@ -35491,7 +38165,7 @@
                 </a:tc>
                 <a:extLst>
                   <a:ext uri="{0D108BD9-81ED-4DB2-BD59-A6C34878D82A}">
-                    <a16:rowId xmlns="" xmlns:a16="http://schemas.microsoft.com/office/drawing/2014/main" val="10005"/>
+                    <a16:rowId xmlns:a16="http://schemas.microsoft.com/office/drawing/2014/main" val="10005"/>
                   </a:ext>
                 </a:extLst>
               </a:tr>
@@ -39433,14 +42107,14 @@
                 <a:gridCol w="2065185">
                   <a:extLst>
                     <a:ext uri="{9D8B030D-6E8A-4147-A177-3AD203B41FA5}">
-                      <a16:colId xmlns="" xmlns:a16="http://schemas.microsoft.com/office/drawing/2014/main" val="20000"/>
+                      <a16:colId xmlns:a16="http://schemas.microsoft.com/office/drawing/2014/main" val="20000"/>
                     </a:ext>
                   </a:extLst>
                 </a:gridCol>
                 <a:gridCol w="1223705">
                   <a:extLst>
                     <a:ext uri="{9D8B030D-6E8A-4147-A177-3AD203B41FA5}">
-                      <a16:colId xmlns="" xmlns:a16="http://schemas.microsoft.com/office/drawing/2014/main" val="20001"/>
+                      <a16:colId xmlns:a16="http://schemas.microsoft.com/office/drawing/2014/main" val="20001"/>
                     </a:ext>
                   </a:extLst>
                 </a:gridCol>
@@ -39512,7 +42186,7 @@
                 </a:tc>
                 <a:extLst>
                   <a:ext uri="{0D108BD9-81ED-4DB2-BD59-A6C34878D82A}">
-                    <a16:rowId xmlns="" xmlns:a16="http://schemas.microsoft.com/office/drawing/2014/main" val="10000"/>
+                    <a16:rowId xmlns:a16="http://schemas.microsoft.com/office/drawing/2014/main" val="10000"/>
                   </a:ext>
                 </a:extLst>
               </a:tr>
@@ -39619,7 +42293,7 @@
                 </a:tc>
                 <a:extLst>
                   <a:ext uri="{0D108BD9-81ED-4DB2-BD59-A6C34878D82A}">
-                    <a16:rowId xmlns="" xmlns:a16="http://schemas.microsoft.com/office/drawing/2014/main" val="10001"/>
+                    <a16:rowId xmlns:a16="http://schemas.microsoft.com/office/drawing/2014/main" val="10001"/>
                   </a:ext>
                 </a:extLst>
               </a:tr>
@@ -39726,7 +42400,7 @@
                 </a:tc>
                 <a:extLst>
                   <a:ext uri="{0D108BD9-81ED-4DB2-BD59-A6C34878D82A}">
-                    <a16:rowId xmlns="" xmlns:a16="http://schemas.microsoft.com/office/drawing/2014/main" val="10002"/>
+                    <a16:rowId xmlns:a16="http://schemas.microsoft.com/office/drawing/2014/main" val="10002"/>
                   </a:ext>
                 </a:extLst>
               </a:tr>
@@ -39833,7 +42507,7 @@
                 </a:tc>
                 <a:extLst>
                   <a:ext uri="{0D108BD9-81ED-4DB2-BD59-A6C34878D82A}">
-                    <a16:rowId xmlns="" xmlns:a16="http://schemas.microsoft.com/office/drawing/2014/main" val="10003"/>
+                    <a16:rowId xmlns:a16="http://schemas.microsoft.com/office/drawing/2014/main" val="10003"/>
                   </a:ext>
                 </a:extLst>
               </a:tr>
@@ -39940,7 +42614,7 @@
                 </a:tc>
                 <a:extLst>
                   <a:ext uri="{0D108BD9-81ED-4DB2-BD59-A6C34878D82A}">
-                    <a16:rowId xmlns="" xmlns:a16="http://schemas.microsoft.com/office/drawing/2014/main" val="10004"/>
+                    <a16:rowId xmlns:a16="http://schemas.microsoft.com/office/drawing/2014/main" val="10004"/>
                   </a:ext>
                 </a:extLst>
               </a:tr>
@@ -40047,7 +42721,7 @@
                 </a:tc>
                 <a:extLst>
                   <a:ext uri="{0D108BD9-81ED-4DB2-BD59-A6C34878D82A}">
-                    <a16:rowId xmlns="" xmlns:a16="http://schemas.microsoft.com/office/drawing/2014/main" val="10005"/>
+                    <a16:rowId xmlns:a16="http://schemas.microsoft.com/office/drawing/2014/main" val="10005"/>
                   </a:ext>
                 </a:extLst>
               </a:tr>
@@ -40154,7 +42828,7 @@
                 </a:tc>
                 <a:extLst>
                   <a:ext uri="{0D108BD9-81ED-4DB2-BD59-A6C34878D82A}">
-                    <a16:rowId xmlns="" xmlns:a16="http://schemas.microsoft.com/office/drawing/2014/main" val="10006"/>
+                    <a16:rowId xmlns:a16="http://schemas.microsoft.com/office/drawing/2014/main" val="10006"/>
                   </a:ext>
                 </a:extLst>
               </a:tr>
@@ -40791,14 +43465,14 @@
                 <a:gridCol w="1298493">
                   <a:extLst>
                     <a:ext uri="{9D8B030D-6E8A-4147-A177-3AD203B41FA5}">
-                      <a16:colId xmlns="" xmlns:a16="http://schemas.microsoft.com/office/drawing/2014/main" val="20000"/>
+                      <a16:colId xmlns:a16="http://schemas.microsoft.com/office/drawing/2014/main" val="20000"/>
                     </a:ext>
                   </a:extLst>
                 </a:gridCol>
                 <a:gridCol w="1473774">
                   <a:extLst>
                     <a:ext uri="{9D8B030D-6E8A-4147-A177-3AD203B41FA5}">
-                      <a16:colId xmlns="" xmlns:a16="http://schemas.microsoft.com/office/drawing/2014/main" val="20001"/>
+                      <a16:colId xmlns:a16="http://schemas.microsoft.com/office/drawing/2014/main" val="20001"/>
                     </a:ext>
                   </a:extLst>
                 </a:gridCol>
@@ -40870,7 +43544,7 @@
                 </a:tc>
                 <a:extLst>
                   <a:ext uri="{0D108BD9-81ED-4DB2-BD59-A6C34878D82A}">
-                    <a16:rowId xmlns="" xmlns:a16="http://schemas.microsoft.com/office/drawing/2014/main" val="10000"/>
+                    <a16:rowId xmlns:a16="http://schemas.microsoft.com/office/drawing/2014/main" val="10000"/>
                   </a:ext>
                 </a:extLst>
               </a:tr>
@@ -40977,7 +43651,7 @@
                 </a:tc>
                 <a:extLst>
                   <a:ext uri="{0D108BD9-81ED-4DB2-BD59-A6C34878D82A}">
-                    <a16:rowId xmlns="" xmlns:a16="http://schemas.microsoft.com/office/drawing/2014/main" val="10001"/>
+                    <a16:rowId xmlns:a16="http://schemas.microsoft.com/office/drawing/2014/main" val="10001"/>
                   </a:ext>
                 </a:extLst>
               </a:tr>
@@ -41084,7 +43758,7 @@
                 </a:tc>
                 <a:extLst>
                   <a:ext uri="{0D108BD9-81ED-4DB2-BD59-A6C34878D82A}">
-                    <a16:rowId xmlns="" xmlns:a16="http://schemas.microsoft.com/office/drawing/2014/main" val="10002"/>
+                    <a16:rowId xmlns:a16="http://schemas.microsoft.com/office/drawing/2014/main" val="10002"/>
                   </a:ext>
                 </a:extLst>
               </a:tr>
@@ -41191,7 +43865,7 @@
                 </a:tc>
                 <a:extLst>
                   <a:ext uri="{0D108BD9-81ED-4DB2-BD59-A6C34878D82A}">
-                    <a16:rowId xmlns="" xmlns:a16="http://schemas.microsoft.com/office/drawing/2014/main" val="10003"/>
+                    <a16:rowId xmlns:a16="http://schemas.microsoft.com/office/drawing/2014/main" val="10003"/>
                   </a:ext>
                 </a:extLst>
               </a:tr>
@@ -41298,7 +43972,7 @@
                 </a:tc>
                 <a:extLst>
                   <a:ext uri="{0D108BD9-81ED-4DB2-BD59-A6C34878D82A}">
-                    <a16:rowId xmlns="" xmlns:a16="http://schemas.microsoft.com/office/drawing/2014/main" val="10004"/>
+                    <a16:rowId xmlns:a16="http://schemas.microsoft.com/office/drawing/2014/main" val="10004"/>
                   </a:ext>
                 </a:extLst>
               </a:tr>
@@ -41405,7 +44079,7 @@
                 </a:tc>
                 <a:extLst>
                   <a:ext uri="{0D108BD9-81ED-4DB2-BD59-A6C34878D82A}">
-                    <a16:rowId xmlns="" xmlns:a16="http://schemas.microsoft.com/office/drawing/2014/main" val="10005"/>
+                    <a16:rowId xmlns:a16="http://schemas.microsoft.com/office/drawing/2014/main" val="10005"/>
                   </a:ext>
                 </a:extLst>
               </a:tr>
@@ -41512,7 +44186,7 @@
                 </a:tc>
                 <a:extLst>
                   <a:ext uri="{0D108BD9-81ED-4DB2-BD59-A6C34878D82A}">
-                    <a16:rowId xmlns="" xmlns:a16="http://schemas.microsoft.com/office/drawing/2014/main" val="10006"/>
+                    <a16:rowId xmlns:a16="http://schemas.microsoft.com/office/drawing/2014/main" val="10006"/>
                   </a:ext>
                 </a:extLst>
               </a:tr>
@@ -42295,7 +44969,7 @@
           <p:nvPr/>
         </p:nvPicPr>
         <p:blipFill>
-          <a:blip r:embed="rId2">
+          <a:blip r:embed="rId3">
             <a:extLst>
               <a:ext uri="{28A0092B-C50C-407E-A947-70E740481C1C}">
                 <a14:useLocalDpi xmlns:a14="http://schemas.microsoft.com/office/drawing/2010/main" val="0"/>
@@ -44253,14 +46927,14 @@
                 <a:gridCol w="5131923">
                   <a:extLst>
                     <a:ext uri="{9D8B030D-6E8A-4147-A177-3AD203B41FA5}">
-                      <a16:colId xmlns="" xmlns:a16="http://schemas.microsoft.com/office/drawing/2014/main" val="20000"/>
+                      <a16:colId xmlns:a16="http://schemas.microsoft.com/office/drawing/2014/main" val="20000"/>
                     </a:ext>
                   </a:extLst>
                 </a:gridCol>
                 <a:gridCol w="5231278">
                   <a:extLst>
                     <a:ext uri="{9D8B030D-6E8A-4147-A177-3AD203B41FA5}">
-                      <a16:colId xmlns="" xmlns:a16="http://schemas.microsoft.com/office/drawing/2014/main" val="20001"/>
+                      <a16:colId xmlns:a16="http://schemas.microsoft.com/office/drawing/2014/main" val="20001"/>
                     </a:ext>
                   </a:extLst>
                 </a:gridCol>
@@ -45301,7 +47975,7 @@
                 </a:tc>
                 <a:extLst>
                   <a:ext uri="{0D108BD9-81ED-4DB2-BD59-A6C34878D82A}">
-                    <a16:rowId xmlns="" xmlns:a16="http://schemas.microsoft.com/office/drawing/2014/main" val="10000"/>
+                    <a16:rowId xmlns:a16="http://schemas.microsoft.com/office/drawing/2014/main" val="10000"/>
                   </a:ext>
                 </a:extLst>
               </a:tr>
@@ -45518,14 +48192,14 @@
                 <a:gridCol w="5133217">
                   <a:extLst>
                     <a:ext uri="{9D8B030D-6E8A-4147-A177-3AD203B41FA5}">
-                      <a16:colId xmlns="" xmlns:a16="http://schemas.microsoft.com/office/drawing/2014/main" val="20000"/>
+                      <a16:colId xmlns:a16="http://schemas.microsoft.com/office/drawing/2014/main" val="20000"/>
                     </a:ext>
                   </a:extLst>
                 </a:gridCol>
                 <a:gridCol w="5944087">
                   <a:extLst>
                     <a:ext uri="{9D8B030D-6E8A-4147-A177-3AD203B41FA5}">
-                      <a16:colId xmlns="" xmlns:a16="http://schemas.microsoft.com/office/drawing/2014/main" val="20001"/>
+                      <a16:colId xmlns:a16="http://schemas.microsoft.com/office/drawing/2014/main" val="20001"/>
                     </a:ext>
                   </a:extLst>
                 </a:gridCol>
@@ -46938,7 +49612,7 @@
                 </a:tc>
                 <a:extLst>
                   <a:ext uri="{0D108BD9-81ED-4DB2-BD59-A6C34878D82A}">
-                    <a16:rowId xmlns="" xmlns:a16="http://schemas.microsoft.com/office/drawing/2014/main" val="10000"/>
+                    <a16:rowId xmlns:a16="http://schemas.microsoft.com/office/drawing/2014/main" val="10000"/>
                   </a:ext>
                 </a:extLst>
               </a:tr>

</xml_diff>